<commit_message>
Updated slides: Objective 1 is finished (pending agreement on stepwise solution)
</commit_message>
<xml_diff>
--- a/Project2_Chang_Craus_Yule.pptx
+++ b/Project2_Chang_Craus_Yule.pptx
@@ -11507,248 +11507,284 @@
             <a:pPr marL="146050" indent="0">
               <a:buNone/>
             </a:pPr>
+            <a:r>
+              <a:rPr lang="en-US" dirty="0"/>
+              <a:t>Note: Data was split into two datasets for training and validation using a 70/30 split</a:t>
+            </a:r>
+          </a:p>
+          <a:p>
+            <a:pPr marL="146050" indent="0">
+              <a:buNone/>
+            </a:pPr>
+            <a:endParaRPr lang="en-US" dirty="0"/>
+          </a:p>
+          <a:p>
+            <a:pPr marL="146050" indent="0">
+              <a:buNone/>
+            </a:pPr>
             <a:endParaRPr lang="en-US" dirty="0"/>
           </a:p>
         </p:txBody>
       </p:sp>
-      <p:sp>
-        <p:nvSpPr>
-          <p:cNvPr id="7" name="Rectangle 6">
+      <p:grpSp>
+        <p:nvGrpSpPr>
+          <p:cNvPr id="4" name="Group 3">
             <a:extLst>
               <a:ext uri="{FF2B5EF4-FFF2-40B4-BE49-F238E27FC236}">
-                <a16:creationId xmlns:a16="http://schemas.microsoft.com/office/drawing/2014/main" id="{61957573-30D3-4E27-9E18-56D2A6B4368C}"/>
+                <a16:creationId xmlns:a16="http://schemas.microsoft.com/office/drawing/2014/main" id="{865AEDED-9AE4-E864-615F-1DD09AB34814}"/>
               </a:ext>
             </a:extLst>
           </p:cNvPr>
-          <p:cNvSpPr/>
+          <p:cNvGrpSpPr/>
           <p:nvPr/>
-        </p:nvSpPr>
-        <p:spPr>
+        </p:nvGrpSpPr>
+        <p:grpSpPr>
           <a:xfrm>
-            <a:off x="3611880" y="2997197"/>
-            <a:ext cx="1920240" cy="1005840"/>
+            <a:off x="515394" y="2997197"/>
+            <a:ext cx="8113212" cy="1005840"/>
+            <a:chOff x="515394" y="2997197"/>
+            <a:chExt cx="8113212" cy="1005840"/>
           </a:xfrm>
-          <a:prstGeom prst="rect">
-            <a:avLst/>
-          </a:prstGeom>
-        </p:spPr>
-        <p:style>
-          <a:lnRef idx="2">
-            <a:schemeClr val="accent1">
-              <a:shade val="50000"/>
-            </a:schemeClr>
-          </a:lnRef>
-          <a:fillRef idx="1">
-            <a:schemeClr val="accent1"/>
-          </a:fillRef>
-          <a:effectRef idx="0">
-            <a:schemeClr val="accent1"/>
-          </a:effectRef>
-          <a:fontRef idx="minor">
-            <a:schemeClr val="lt1"/>
-          </a:fontRef>
-        </p:style>
-        <p:txBody>
-          <a:bodyPr rtlCol="0" anchor="ctr"/>
-          <a:lstStyle/>
-          <a:p>
-            <a:pPr algn="ctr"/>
-            <a:r>
-              <a:rPr lang="en-US" dirty="0"/>
-              <a:t>Feature Selection</a:t>
-            </a:r>
-          </a:p>
-        </p:txBody>
-      </p:sp>
-      <p:sp>
-        <p:nvSpPr>
-          <p:cNvPr id="11" name="Rectangle 10">
-            <a:extLst>
-              <a:ext uri="{FF2B5EF4-FFF2-40B4-BE49-F238E27FC236}">
-                <a16:creationId xmlns:a16="http://schemas.microsoft.com/office/drawing/2014/main" id="{75729A82-735C-7A6D-FEEC-AFFC52E95A03}"/>
-              </a:ext>
-            </a:extLst>
-          </p:cNvPr>
-          <p:cNvSpPr/>
-          <p:nvPr/>
-        </p:nvSpPr>
-        <p:spPr>
-          <a:xfrm>
-            <a:off x="725850" y="3140888"/>
-            <a:ext cx="1618343" cy="718457"/>
-          </a:xfrm>
-          <a:prstGeom prst="rect">
-            <a:avLst/>
-          </a:prstGeom>
-          <a:noFill/>
-        </p:spPr>
-        <p:style>
-          <a:lnRef idx="2">
-            <a:schemeClr val="accent1">
-              <a:shade val="50000"/>
-            </a:schemeClr>
-          </a:lnRef>
-          <a:fillRef idx="1">
-            <a:schemeClr val="accent1"/>
-          </a:fillRef>
-          <a:effectRef idx="0">
-            <a:schemeClr val="accent1"/>
-          </a:effectRef>
-          <a:fontRef idx="minor">
-            <a:schemeClr val="lt1"/>
-          </a:fontRef>
-        </p:style>
-        <p:txBody>
-          <a:bodyPr rtlCol="0" anchor="ctr"/>
-          <a:lstStyle/>
-          <a:p>
-            <a:pPr algn="ctr"/>
-            <a:r>
-              <a:rPr lang="en-US" dirty="0">
-                <a:solidFill>
-                  <a:schemeClr val="accent3"/>
-                </a:solidFill>
-              </a:rPr>
-              <a:t>17 Variables</a:t>
-            </a:r>
-          </a:p>
-        </p:txBody>
-      </p:sp>
-      <p:cxnSp>
-        <p:nvCxnSpPr>
-          <p:cNvPr id="13" name="Straight Arrow Connector 12">
-            <a:extLst>
-              <a:ext uri="{FF2B5EF4-FFF2-40B4-BE49-F238E27FC236}">
-                <a16:creationId xmlns:a16="http://schemas.microsoft.com/office/drawing/2014/main" id="{5F70714E-EFC6-2B2F-A8C0-39BE5507BA5C}"/>
-              </a:ext>
-            </a:extLst>
-          </p:cNvPr>
-          <p:cNvCxnSpPr>
-            <a:stCxn id="11" idx="3"/>
-            <a:endCxn id="7" idx="1"/>
-          </p:cNvCxnSpPr>
-          <p:nvPr/>
-        </p:nvCxnSpPr>
-        <p:spPr>
-          <a:xfrm>
-            <a:off x="2344193" y="3500117"/>
-            <a:ext cx="1267687" cy="0"/>
-          </a:xfrm>
-          <a:prstGeom prst="straightConnector1">
-            <a:avLst/>
-          </a:prstGeom>
-          <a:ln w="34925">
-            <a:tailEnd type="triangle"/>
-          </a:ln>
-        </p:spPr>
-        <p:style>
-          <a:lnRef idx="1">
-            <a:schemeClr val="accent1"/>
-          </a:lnRef>
-          <a:fillRef idx="0">
-            <a:schemeClr val="accent1"/>
-          </a:fillRef>
-          <a:effectRef idx="0">
-            <a:schemeClr val="accent1"/>
-          </a:effectRef>
-          <a:fontRef idx="minor">
-            <a:schemeClr val="tx1"/>
-          </a:fontRef>
-        </p:style>
-      </p:cxnSp>
-      <p:cxnSp>
-        <p:nvCxnSpPr>
-          <p:cNvPr id="14" name="Straight Arrow Connector 13">
-            <a:extLst>
-              <a:ext uri="{FF2B5EF4-FFF2-40B4-BE49-F238E27FC236}">
-                <a16:creationId xmlns:a16="http://schemas.microsoft.com/office/drawing/2014/main" id="{90A5251D-9421-2030-1905-795CC510DAF8}"/>
-              </a:ext>
-            </a:extLst>
-          </p:cNvPr>
-          <p:cNvCxnSpPr/>
-          <p:nvPr/>
-        </p:nvCxnSpPr>
-        <p:spPr>
-          <a:xfrm>
-            <a:off x="5532120" y="3500116"/>
-            <a:ext cx="1267687" cy="0"/>
-          </a:xfrm>
-          <a:prstGeom prst="straightConnector1">
-            <a:avLst/>
-          </a:prstGeom>
-          <a:ln w="34925">
-            <a:tailEnd type="triangle"/>
-          </a:ln>
-        </p:spPr>
-        <p:style>
-          <a:lnRef idx="1">
-            <a:schemeClr val="accent1"/>
-          </a:lnRef>
-          <a:fillRef idx="0">
-            <a:schemeClr val="accent1"/>
-          </a:fillRef>
-          <a:effectRef idx="0">
-            <a:schemeClr val="accent1"/>
-          </a:effectRef>
-          <a:fontRef idx="minor">
-            <a:schemeClr val="tx1"/>
-          </a:fontRef>
-        </p:style>
-      </p:cxnSp>
-      <p:sp>
-        <p:nvSpPr>
-          <p:cNvPr id="15" name="Rectangle 14">
-            <a:extLst>
-              <a:ext uri="{FF2B5EF4-FFF2-40B4-BE49-F238E27FC236}">
-                <a16:creationId xmlns:a16="http://schemas.microsoft.com/office/drawing/2014/main" id="{F395180F-2E5B-5B25-77F4-1F62C9612845}"/>
-              </a:ext>
-            </a:extLst>
-          </p:cNvPr>
-          <p:cNvSpPr/>
-          <p:nvPr/>
-        </p:nvSpPr>
-        <p:spPr>
-          <a:xfrm>
-            <a:off x="6799807" y="3140887"/>
-            <a:ext cx="1618343" cy="718457"/>
-          </a:xfrm>
-          <a:prstGeom prst="rect">
-            <a:avLst/>
-          </a:prstGeom>
-          <a:noFill/>
-        </p:spPr>
-        <p:style>
-          <a:lnRef idx="2">
-            <a:schemeClr val="accent1">
-              <a:shade val="50000"/>
-            </a:schemeClr>
-          </a:lnRef>
-          <a:fillRef idx="1">
-            <a:schemeClr val="accent1"/>
-          </a:fillRef>
-          <a:effectRef idx="0">
-            <a:schemeClr val="accent1"/>
-          </a:effectRef>
-          <a:fontRef idx="minor">
-            <a:schemeClr val="lt1"/>
-          </a:fontRef>
-        </p:style>
-        <p:txBody>
-          <a:bodyPr rtlCol="0" anchor="ctr"/>
-          <a:lstStyle/>
-          <a:p>
-            <a:pPr algn="ctr"/>
-            <a:r>
-              <a:rPr lang="en-US" dirty="0">
-                <a:solidFill>
-                  <a:schemeClr val="tx1"/>
-                </a:solidFill>
-              </a:rPr>
-              <a:t>Reduction in variables</a:t>
-            </a:r>
-          </a:p>
-        </p:txBody>
-      </p:sp>
+        </p:grpSpPr>
+        <p:sp>
+          <p:nvSpPr>
+            <p:cNvPr id="7" name="Rectangle 6">
+              <a:extLst>
+                <a:ext uri="{FF2B5EF4-FFF2-40B4-BE49-F238E27FC236}">
+                  <a16:creationId xmlns:a16="http://schemas.microsoft.com/office/drawing/2014/main" id="{61957573-30D3-4E27-9E18-56D2A6B4368C}"/>
+                </a:ext>
+              </a:extLst>
+            </p:cNvPr>
+            <p:cNvSpPr/>
+            <p:nvPr/>
+          </p:nvSpPr>
+          <p:spPr>
+            <a:xfrm>
+              <a:off x="3611880" y="2997197"/>
+              <a:ext cx="1920240" cy="1005840"/>
+            </a:xfrm>
+            <a:prstGeom prst="rect">
+              <a:avLst/>
+            </a:prstGeom>
+          </p:spPr>
+          <p:style>
+            <a:lnRef idx="2">
+              <a:schemeClr val="accent1">
+                <a:shade val="50000"/>
+              </a:schemeClr>
+            </a:lnRef>
+            <a:fillRef idx="1">
+              <a:schemeClr val="accent1"/>
+            </a:fillRef>
+            <a:effectRef idx="0">
+              <a:schemeClr val="accent1"/>
+            </a:effectRef>
+            <a:fontRef idx="minor">
+              <a:schemeClr val="lt1"/>
+            </a:fontRef>
+          </p:style>
+          <p:txBody>
+            <a:bodyPr rtlCol="0" anchor="ctr"/>
+            <a:lstStyle/>
+            <a:p>
+              <a:pPr algn="ctr"/>
+              <a:r>
+                <a:rPr lang="en-US" dirty="0"/>
+                <a:t>Feature Selection</a:t>
+              </a:r>
+            </a:p>
+          </p:txBody>
+        </p:sp>
+        <p:sp>
+          <p:nvSpPr>
+            <p:cNvPr id="11" name="Rectangle 10">
+              <a:extLst>
+                <a:ext uri="{FF2B5EF4-FFF2-40B4-BE49-F238E27FC236}">
+                  <a16:creationId xmlns:a16="http://schemas.microsoft.com/office/drawing/2014/main" id="{75729A82-735C-7A6D-FEEC-AFFC52E95A03}"/>
+                </a:ext>
+              </a:extLst>
+            </p:cNvPr>
+            <p:cNvSpPr/>
+            <p:nvPr/>
+          </p:nvSpPr>
+          <p:spPr>
+            <a:xfrm>
+              <a:off x="515394" y="3140886"/>
+              <a:ext cx="1828800" cy="718457"/>
+            </a:xfrm>
+            <a:prstGeom prst="rect">
+              <a:avLst/>
+            </a:prstGeom>
+            <a:noFill/>
+          </p:spPr>
+          <p:style>
+            <a:lnRef idx="2">
+              <a:schemeClr val="accent1">
+                <a:shade val="50000"/>
+              </a:schemeClr>
+            </a:lnRef>
+            <a:fillRef idx="1">
+              <a:schemeClr val="accent1"/>
+            </a:fillRef>
+            <a:effectRef idx="0">
+              <a:schemeClr val="accent1"/>
+            </a:effectRef>
+            <a:fontRef idx="minor">
+              <a:schemeClr val="lt1"/>
+            </a:fontRef>
+          </p:style>
+          <p:txBody>
+            <a:bodyPr rtlCol="0" anchor="ctr"/>
+            <a:lstStyle/>
+            <a:p>
+              <a:pPr algn="ctr"/>
+              <a:r>
+                <a:rPr lang="en-US" dirty="0">
+                  <a:solidFill>
+                    <a:schemeClr val="accent3"/>
+                  </a:solidFill>
+                </a:rPr>
+                <a:t>17 Variables</a:t>
+              </a:r>
+            </a:p>
+          </p:txBody>
+        </p:sp>
+        <p:cxnSp>
+          <p:nvCxnSpPr>
+            <p:cNvPr id="13" name="Straight Arrow Connector 12">
+              <a:extLst>
+                <a:ext uri="{FF2B5EF4-FFF2-40B4-BE49-F238E27FC236}">
+                  <a16:creationId xmlns:a16="http://schemas.microsoft.com/office/drawing/2014/main" id="{5F70714E-EFC6-2B2F-A8C0-39BE5507BA5C}"/>
+                </a:ext>
+              </a:extLst>
+            </p:cNvPr>
+            <p:cNvCxnSpPr>
+              <a:stCxn id="11" idx="3"/>
+              <a:endCxn id="7" idx="1"/>
+            </p:cNvCxnSpPr>
+            <p:nvPr/>
+          </p:nvCxnSpPr>
+          <p:spPr>
+            <a:xfrm>
+              <a:off x="2344194" y="3500115"/>
+              <a:ext cx="1267686" cy="2"/>
+            </a:xfrm>
+            <a:prstGeom prst="straightConnector1">
+              <a:avLst/>
+            </a:prstGeom>
+            <a:ln w="34925">
+              <a:tailEnd type="triangle"/>
+            </a:ln>
+          </p:spPr>
+          <p:style>
+            <a:lnRef idx="1">
+              <a:schemeClr val="accent1"/>
+            </a:lnRef>
+            <a:fillRef idx="0">
+              <a:schemeClr val="accent1"/>
+            </a:fillRef>
+            <a:effectRef idx="0">
+              <a:schemeClr val="accent1"/>
+            </a:effectRef>
+            <a:fontRef idx="minor">
+              <a:schemeClr val="tx1"/>
+            </a:fontRef>
+          </p:style>
+        </p:cxnSp>
+        <p:cxnSp>
+          <p:nvCxnSpPr>
+            <p:cNvPr id="14" name="Straight Arrow Connector 13">
+              <a:extLst>
+                <a:ext uri="{FF2B5EF4-FFF2-40B4-BE49-F238E27FC236}">
+                  <a16:creationId xmlns:a16="http://schemas.microsoft.com/office/drawing/2014/main" id="{90A5251D-9421-2030-1905-795CC510DAF8}"/>
+                </a:ext>
+              </a:extLst>
+            </p:cNvPr>
+            <p:cNvCxnSpPr/>
+            <p:nvPr/>
+          </p:nvCxnSpPr>
+          <p:spPr>
+            <a:xfrm>
+              <a:off x="5532120" y="3500116"/>
+              <a:ext cx="1267687" cy="0"/>
+            </a:xfrm>
+            <a:prstGeom prst="straightConnector1">
+              <a:avLst/>
+            </a:prstGeom>
+            <a:ln w="34925">
+              <a:tailEnd type="triangle"/>
+            </a:ln>
+          </p:spPr>
+          <p:style>
+            <a:lnRef idx="1">
+              <a:schemeClr val="accent1"/>
+            </a:lnRef>
+            <a:fillRef idx="0">
+              <a:schemeClr val="accent1"/>
+            </a:fillRef>
+            <a:effectRef idx="0">
+              <a:schemeClr val="accent1"/>
+            </a:effectRef>
+            <a:fontRef idx="minor">
+              <a:schemeClr val="tx1"/>
+            </a:fontRef>
+          </p:style>
+        </p:cxnSp>
+        <p:sp>
+          <p:nvSpPr>
+            <p:cNvPr id="15" name="Rectangle 14">
+              <a:extLst>
+                <a:ext uri="{FF2B5EF4-FFF2-40B4-BE49-F238E27FC236}">
+                  <a16:creationId xmlns:a16="http://schemas.microsoft.com/office/drawing/2014/main" id="{F395180F-2E5B-5B25-77F4-1F62C9612845}"/>
+                </a:ext>
+              </a:extLst>
+            </p:cNvPr>
+            <p:cNvSpPr/>
+            <p:nvPr/>
+          </p:nvSpPr>
+          <p:spPr>
+            <a:xfrm>
+              <a:off x="6799806" y="3140887"/>
+              <a:ext cx="1828800" cy="718457"/>
+            </a:xfrm>
+            <a:prstGeom prst="rect">
+              <a:avLst/>
+            </a:prstGeom>
+            <a:noFill/>
+          </p:spPr>
+          <p:style>
+            <a:lnRef idx="2">
+              <a:schemeClr val="accent1">
+                <a:shade val="50000"/>
+              </a:schemeClr>
+            </a:lnRef>
+            <a:fillRef idx="1">
+              <a:schemeClr val="accent1"/>
+            </a:fillRef>
+            <a:effectRef idx="0">
+              <a:schemeClr val="accent1"/>
+            </a:effectRef>
+            <a:fontRef idx="minor">
+              <a:schemeClr val="lt1"/>
+            </a:fontRef>
+          </p:style>
+          <p:txBody>
+            <a:bodyPr rtlCol="0" anchor="ctr"/>
+            <a:lstStyle/>
+            <a:p>
+              <a:pPr algn="ctr"/>
+              <a:r>
+                <a:rPr lang="en-US" dirty="0">
+                  <a:solidFill>
+                    <a:schemeClr val="tx1"/>
+                  </a:solidFill>
+                </a:rPr>
+                <a:t>Reduction in variables to improve interpretation</a:t>
+              </a:r>
+            </a:p>
+          </p:txBody>
+        </p:sp>
+      </p:grpSp>
     </p:spTree>
     <p:custDataLst>
       <p:tags r:id="rId1"/>
@@ -12168,8 +12204,8 @@
         </p:blipFill>
         <p:spPr>
           <a:xfrm>
-            <a:off x="1324084" y="2191767"/>
-            <a:ext cx="6492232" cy="2951733"/>
+            <a:off x="1537929" y="2191767"/>
+            <a:ext cx="6064542" cy="2951733"/>
           </a:xfrm>
           <a:prstGeom prst="rect">
             <a:avLst/>
@@ -12192,7 +12228,7 @@
         </p:nvCxnSpPr>
         <p:spPr>
           <a:xfrm flipH="1">
-            <a:off x="3497943" y="3667633"/>
+            <a:off x="3573359" y="3667633"/>
             <a:ext cx="312057" cy="352824"/>
           </a:xfrm>
           <a:prstGeom prst="straightConnector1">
@@ -12505,7 +12541,23 @@
                   <a:schemeClr val="accent3"/>
                 </a:solidFill>
               </a:rPr>
-              <a:t>Diminishing returns are found after the 5 variable is included</a:t>
+              <a:t>Diminishing returns are found after the 5</a:t>
+            </a:r>
+            <a:r>
+              <a:rPr lang="en-US" baseline="30000" dirty="0">
+                <a:solidFill>
+                  <a:schemeClr val="accent3"/>
+                </a:solidFill>
+              </a:rPr>
+              <a:t>th</a:t>
+            </a:r>
+            <a:r>
+              <a:rPr lang="en-US" dirty="0">
+                <a:solidFill>
+                  <a:schemeClr val="accent3"/>
+                </a:solidFill>
+              </a:rPr>
+              <a:t> variable is included</a:t>
             </a:r>
           </a:p>
         </p:txBody>
@@ -12615,295 +12667,350 @@
           </a:p>
         </p:txBody>
       </p:sp>
-      <p:sp>
-        <p:nvSpPr>
-          <p:cNvPr id="5" name="Text Placeholder 2">
+      <p:graphicFrame>
+        <p:nvGraphicFramePr>
+          <p:cNvPr id="3" name="Table 3">
             <a:extLst>
               <a:ext uri="{FF2B5EF4-FFF2-40B4-BE49-F238E27FC236}">
-                <a16:creationId xmlns:a16="http://schemas.microsoft.com/office/drawing/2014/main" id="{80A4736F-1EF9-09F0-5145-9AB37B5FE409}"/>
+                <a16:creationId xmlns:a16="http://schemas.microsoft.com/office/drawing/2014/main" id="{CA4AB027-E888-2C3E-8C1E-4D6BB2527F50}"/>
               </a:ext>
             </a:extLst>
           </p:cNvPr>
-          <p:cNvSpPr txBox="1">
-            <a:spLocks/>
-          </p:cNvSpPr>
+          <p:cNvGraphicFramePr>
+            <a:graphicFrameLocks noGrp="1"/>
+          </p:cNvGraphicFramePr>
+          <p:nvPr>
+            <p:extLst>
+              <p:ext uri="{D42A27DB-BD31-4B8C-83A1-F6EECF244321}">
+                <p14:modId xmlns:p14="http://schemas.microsoft.com/office/powerpoint/2010/main" val="1525066425"/>
+              </p:ext>
+            </p:extLst>
+          </p:nvPr>
+        </p:nvGraphicFramePr>
+        <p:xfrm>
+          <a:off x="725850" y="1761144"/>
+          <a:ext cx="4064000" cy="2966720"/>
+        </p:xfrm>
+        <a:graphic>
+          <a:graphicData uri="http://schemas.openxmlformats.org/drawingml/2006/table">
+            <a:tbl>
+              <a:tblPr firstRow="1" bandRow="1">
+                <a:tableStyleId>{5C22544A-7EE6-4342-B048-85BDC9FD1C3A}</a:tableStyleId>
+              </a:tblPr>
+              <a:tblGrid>
+                <a:gridCol w="2032000">
+                  <a:extLst>
+                    <a:ext uri="{9D8B030D-6E8A-4147-A177-3AD203B41FA5}">
+                      <a16:colId xmlns:a16="http://schemas.microsoft.com/office/drawing/2014/main" val="2004211147"/>
+                    </a:ext>
+                  </a:extLst>
+                </a:gridCol>
+                <a:gridCol w="2032000">
+                  <a:extLst>
+                    <a:ext uri="{9D8B030D-6E8A-4147-A177-3AD203B41FA5}">
+                      <a16:colId xmlns:a16="http://schemas.microsoft.com/office/drawing/2014/main" val="2024557235"/>
+                    </a:ext>
+                  </a:extLst>
+                </a:gridCol>
+              </a:tblGrid>
+              <a:tr h="370840">
+                <a:tc>
+                  <a:txBody>
+                    <a:bodyPr/>
+                    <a:lstStyle/>
+                    <a:p>
+                      <a:r>
+                        <a:rPr lang="en-US" dirty="0"/>
+                        <a:t>Metric</a:t>
+                      </a:r>
+                    </a:p>
+                  </a:txBody>
+                  <a:tcPr/>
+                </a:tc>
+                <a:tc>
+                  <a:txBody>
+                    <a:bodyPr/>
+                    <a:lstStyle/>
+                    <a:p>
+                      <a:r>
+                        <a:rPr lang="en-US" dirty="0"/>
+                        <a:t>Score</a:t>
+                      </a:r>
+                    </a:p>
+                  </a:txBody>
+                  <a:tcPr/>
+                </a:tc>
+                <a:extLst>
+                  <a:ext uri="{0D108BD9-81ED-4DB2-BD59-A6C34878D82A}">
+                    <a16:rowId xmlns:a16="http://schemas.microsoft.com/office/drawing/2014/main" val="606250503"/>
+                  </a:ext>
+                </a:extLst>
+              </a:tr>
+              <a:tr h="370840">
+                <a:tc>
+                  <a:txBody>
+                    <a:bodyPr/>
+                    <a:lstStyle/>
+                    <a:p>
+                      <a:r>
+                        <a:rPr lang="en-US" dirty="0"/>
+                        <a:t>AIC</a:t>
+                      </a:r>
+                    </a:p>
+                  </a:txBody>
+                  <a:tcPr/>
+                </a:tc>
+                <a:tc>
+                  <a:txBody>
+                    <a:bodyPr/>
+                    <a:lstStyle/>
+                    <a:p>
+                      <a:r>
+                        <a:rPr lang="en-US" dirty="0"/>
+                        <a:t>15,485</a:t>
+                      </a:r>
+                    </a:p>
+                  </a:txBody>
+                  <a:tcPr/>
+                </a:tc>
+                <a:extLst>
+                  <a:ext uri="{0D108BD9-81ED-4DB2-BD59-A6C34878D82A}">
+                    <a16:rowId xmlns:a16="http://schemas.microsoft.com/office/drawing/2014/main" val="3146497599"/>
+                  </a:ext>
+                </a:extLst>
+              </a:tr>
+              <a:tr h="370840">
+                <a:tc>
+                  <a:txBody>
+                    <a:bodyPr/>
+                    <a:lstStyle/>
+                    <a:p>
+                      <a:r>
+                        <a:rPr lang="en-US" dirty="0"/>
+                        <a:t>Accuracy</a:t>
+                      </a:r>
+                    </a:p>
+                  </a:txBody>
+                  <a:tcPr/>
+                </a:tc>
+                <a:tc>
+                  <a:txBody>
+                    <a:bodyPr/>
+                    <a:lstStyle/>
+                    <a:p>
+                      <a:r>
+                        <a:rPr lang="en-US" dirty="0"/>
+                        <a:t>81%</a:t>
+                      </a:r>
+                    </a:p>
+                  </a:txBody>
+                  <a:tcPr/>
+                </a:tc>
+                <a:extLst>
+                  <a:ext uri="{0D108BD9-81ED-4DB2-BD59-A6C34878D82A}">
+                    <a16:rowId xmlns:a16="http://schemas.microsoft.com/office/drawing/2014/main" val="1616612204"/>
+                  </a:ext>
+                </a:extLst>
+              </a:tr>
+              <a:tr h="370840">
+                <a:tc>
+                  <a:txBody>
+                    <a:bodyPr/>
+                    <a:lstStyle/>
+                    <a:p>
+                      <a:r>
+                        <a:rPr lang="en-US" dirty="0"/>
+                        <a:t>Sensitivity</a:t>
+                      </a:r>
+                    </a:p>
+                  </a:txBody>
+                  <a:tcPr/>
+                </a:tc>
+                <a:tc>
+                  <a:txBody>
+                    <a:bodyPr/>
+                    <a:lstStyle/>
+                    <a:p>
+                      <a:r>
+                        <a:rPr lang="en-US" dirty="0"/>
+                        <a:t>81%</a:t>
+                      </a:r>
+                    </a:p>
+                  </a:txBody>
+                  <a:tcPr/>
+                </a:tc>
+                <a:extLst>
+                  <a:ext uri="{0D108BD9-81ED-4DB2-BD59-A6C34878D82A}">
+                    <a16:rowId xmlns:a16="http://schemas.microsoft.com/office/drawing/2014/main" val="2652376005"/>
+                  </a:ext>
+                </a:extLst>
+              </a:tr>
+              <a:tr h="370840">
+                <a:tc>
+                  <a:txBody>
+                    <a:bodyPr/>
+                    <a:lstStyle/>
+                    <a:p>
+                      <a:r>
+                        <a:rPr lang="en-US" dirty="0"/>
+                        <a:t>Specificity</a:t>
+                      </a:r>
+                    </a:p>
+                  </a:txBody>
+                  <a:tcPr/>
+                </a:tc>
+                <a:tc>
+                  <a:txBody>
+                    <a:bodyPr/>
+                    <a:lstStyle/>
+                    <a:p>
+                      <a:r>
+                        <a:rPr lang="en-US" dirty="0"/>
+                        <a:t>86%</a:t>
+                      </a:r>
+                    </a:p>
+                  </a:txBody>
+                  <a:tcPr/>
+                </a:tc>
+                <a:extLst>
+                  <a:ext uri="{0D108BD9-81ED-4DB2-BD59-A6C34878D82A}">
+                    <a16:rowId xmlns:a16="http://schemas.microsoft.com/office/drawing/2014/main" val="3781162483"/>
+                  </a:ext>
+                </a:extLst>
+              </a:tr>
+              <a:tr h="370840">
+                <a:tc>
+                  <a:txBody>
+                    <a:bodyPr/>
+                    <a:lstStyle/>
+                    <a:p>
+                      <a:r>
+                        <a:rPr lang="en-US" dirty="0"/>
+                        <a:t>PPV</a:t>
+                      </a:r>
+                    </a:p>
+                  </a:txBody>
+                  <a:tcPr/>
+                </a:tc>
+                <a:tc>
+                  <a:txBody>
+                    <a:bodyPr/>
+                    <a:lstStyle/>
+                    <a:p>
+                      <a:r>
+                        <a:rPr lang="en-US" dirty="0"/>
+                        <a:t>97%</a:t>
+                      </a:r>
+                    </a:p>
+                  </a:txBody>
+                  <a:tcPr/>
+                </a:tc>
+                <a:extLst>
+                  <a:ext uri="{0D108BD9-81ED-4DB2-BD59-A6C34878D82A}">
+                    <a16:rowId xmlns:a16="http://schemas.microsoft.com/office/drawing/2014/main" val="3095442458"/>
+                  </a:ext>
+                </a:extLst>
+              </a:tr>
+              <a:tr h="370840">
+                <a:tc>
+                  <a:txBody>
+                    <a:bodyPr/>
+                    <a:lstStyle/>
+                    <a:p>
+                      <a:r>
+                        <a:rPr lang="en-US" dirty="0"/>
+                        <a:t>NPV</a:t>
+                      </a:r>
+                    </a:p>
+                  </a:txBody>
+                  <a:tcPr/>
+                </a:tc>
+                <a:tc>
+                  <a:txBody>
+                    <a:bodyPr/>
+                    <a:lstStyle/>
+                    <a:p>
+                      <a:r>
+                        <a:rPr lang="en-US" dirty="0"/>
+                        <a:t>38%</a:t>
+                      </a:r>
+                    </a:p>
+                  </a:txBody>
+                  <a:tcPr/>
+                </a:tc>
+                <a:extLst>
+                  <a:ext uri="{0D108BD9-81ED-4DB2-BD59-A6C34878D82A}">
+                    <a16:rowId xmlns:a16="http://schemas.microsoft.com/office/drawing/2014/main" val="2715389844"/>
+                  </a:ext>
+                </a:extLst>
+              </a:tr>
+              <a:tr h="370840">
+                <a:tc>
+                  <a:txBody>
+                    <a:bodyPr/>
+                    <a:lstStyle/>
+                    <a:p>
+                      <a:r>
+                        <a:rPr lang="en-US" dirty="0"/>
+                        <a:t>AUROC</a:t>
+                      </a:r>
+                    </a:p>
+                  </a:txBody>
+                  <a:tcPr/>
+                </a:tc>
+                <a:tc>
+                  <a:txBody>
+                    <a:bodyPr/>
+                    <a:lstStyle/>
+                    <a:p>
+                      <a:r>
+                        <a:rPr lang="en-US" dirty="0"/>
+                        <a:t>0.9045</a:t>
+                      </a:r>
+                    </a:p>
+                  </a:txBody>
+                  <a:tcPr/>
+                </a:tc>
+                <a:extLst>
+                  <a:ext uri="{0D108BD9-81ED-4DB2-BD59-A6C34878D82A}">
+                    <a16:rowId xmlns:a16="http://schemas.microsoft.com/office/drawing/2014/main" val="3759069719"/>
+                  </a:ext>
+                </a:extLst>
+              </a:tr>
+            </a:tbl>
+          </a:graphicData>
+        </a:graphic>
+      </p:graphicFrame>
+      <p:pic>
+        <p:nvPicPr>
+          <p:cNvPr id="6" name="Picture 5" descr="Chart&#10;&#10;Description automatically generated">
+            <a:extLst>
+              <a:ext uri="{FF2B5EF4-FFF2-40B4-BE49-F238E27FC236}">
+                <a16:creationId xmlns:a16="http://schemas.microsoft.com/office/drawing/2014/main" id="{BB69DD76-C768-A0C3-81CB-B2E581EFE1D2}"/>
+              </a:ext>
+            </a:extLst>
+          </p:cNvPr>
+          <p:cNvPicPr>
+            <a:picLocks noChangeAspect="1"/>
+          </p:cNvPicPr>
           <p:nvPr/>
-        </p:nvSpPr>
+        </p:nvPicPr>
+        <p:blipFill>
+          <a:blip r:embed="rId4"/>
+          <a:stretch>
+            <a:fillRect/>
+          </a:stretch>
+        </p:blipFill>
         <p:spPr>
           <a:xfrm>
-            <a:off x="725850" y="1761144"/>
-            <a:ext cx="7688700" cy="445028"/>
+            <a:off x="5036457" y="1446514"/>
+            <a:ext cx="3962400" cy="3378200"/>
           </a:xfrm>
           <a:prstGeom prst="rect">
             <a:avLst/>
           </a:prstGeom>
-          <a:noFill/>
-          <a:ln>
-            <a:noFill/>
-          </a:ln>
         </p:spPr>
-        <p:txBody>
-          <a:bodyPr spcFirstLastPara="1" wrap="square" lIns="91425" tIns="91425" rIns="91425" bIns="91425" anchor="t" anchorCtr="0">
-            <a:noAutofit/>
-          </a:bodyPr>
-          <a:lstStyle>
-            <a:defPPr marR="0" lvl="0" algn="l" rtl="0">
-              <a:lnSpc>
-                <a:spcPct val="100000"/>
-              </a:lnSpc>
-              <a:spcBef>
-                <a:spcPts val="0"/>
-              </a:spcBef>
-              <a:spcAft>
-                <a:spcPts val="0"/>
-              </a:spcAft>
-            </a:defPPr>
-            <a:lvl1pPr marL="457200" marR="0" lvl="0" indent="-311150" algn="l" rtl="0">
-              <a:lnSpc>
-                <a:spcPct val="115000"/>
-              </a:lnSpc>
-              <a:spcBef>
-                <a:spcPts val="0"/>
-              </a:spcBef>
-              <a:spcAft>
-                <a:spcPts val="0"/>
-              </a:spcAft>
-              <a:buClr>
-                <a:schemeClr val="accent1"/>
-              </a:buClr>
-              <a:buSzPts val="1300"/>
-              <a:buFont typeface="Lato"/>
-              <a:buChar char="●"/>
-              <a:defRPr sz="1300" b="0" i="0" u="none" strike="noStrike" cap="none">
-                <a:solidFill>
-                  <a:schemeClr val="accent1"/>
-                </a:solidFill>
-                <a:latin typeface="Lato"/>
-                <a:ea typeface="Lato"/>
-                <a:cs typeface="Lato"/>
-                <a:sym typeface="Lato"/>
-              </a:defRPr>
-            </a:lvl1pPr>
-            <a:lvl2pPr marL="914400" marR="0" lvl="1" indent="-298450" algn="l" rtl="0">
-              <a:lnSpc>
-                <a:spcPct val="115000"/>
-              </a:lnSpc>
-              <a:spcBef>
-                <a:spcPts val="1600"/>
-              </a:spcBef>
-              <a:spcAft>
-                <a:spcPts val="0"/>
-              </a:spcAft>
-              <a:buClr>
-                <a:schemeClr val="accent1"/>
-              </a:buClr>
-              <a:buSzPts val="1100"/>
-              <a:buFont typeface="Lato"/>
-              <a:buChar char="○"/>
-              <a:defRPr sz="1100" b="0" i="0" u="none" strike="noStrike" cap="none">
-                <a:solidFill>
-                  <a:schemeClr val="accent1"/>
-                </a:solidFill>
-                <a:latin typeface="Lato"/>
-                <a:ea typeface="Lato"/>
-                <a:cs typeface="Lato"/>
-                <a:sym typeface="Lato"/>
-              </a:defRPr>
-            </a:lvl2pPr>
-            <a:lvl3pPr marL="1371600" marR="0" lvl="2" indent="-298450" algn="l" rtl="0">
-              <a:lnSpc>
-                <a:spcPct val="115000"/>
-              </a:lnSpc>
-              <a:spcBef>
-                <a:spcPts val="1600"/>
-              </a:spcBef>
-              <a:spcAft>
-                <a:spcPts val="0"/>
-              </a:spcAft>
-              <a:buClr>
-                <a:schemeClr val="accent1"/>
-              </a:buClr>
-              <a:buSzPts val="1100"/>
-              <a:buFont typeface="Lato"/>
-              <a:buChar char="■"/>
-              <a:defRPr sz="1100" b="0" i="0" u="none" strike="noStrike" cap="none">
-                <a:solidFill>
-                  <a:schemeClr val="accent1"/>
-                </a:solidFill>
-                <a:latin typeface="Lato"/>
-                <a:ea typeface="Lato"/>
-                <a:cs typeface="Lato"/>
-                <a:sym typeface="Lato"/>
-              </a:defRPr>
-            </a:lvl3pPr>
-            <a:lvl4pPr marL="1828800" marR="0" lvl="3" indent="-298450" algn="l" rtl="0">
-              <a:lnSpc>
-                <a:spcPct val="115000"/>
-              </a:lnSpc>
-              <a:spcBef>
-                <a:spcPts val="1600"/>
-              </a:spcBef>
-              <a:spcAft>
-                <a:spcPts val="0"/>
-              </a:spcAft>
-              <a:buClr>
-                <a:schemeClr val="accent1"/>
-              </a:buClr>
-              <a:buSzPts val="1100"/>
-              <a:buFont typeface="Lato"/>
-              <a:buChar char="●"/>
-              <a:defRPr sz="1100" b="0" i="0" u="none" strike="noStrike" cap="none">
-                <a:solidFill>
-                  <a:schemeClr val="accent1"/>
-                </a:solidFill>
-                <a:latin typeface="Lato"/>
-                <a:ea typeface="Lato"/>
-                <a:cs typeface="Lato"/>
-                <a:sym typeface="Lato"/>
-              </a:defRPr>
-            </a:lvl4pPr>
-            <a:lvl5pPr marL="2286000" marR="0" lvl="4" indent="-298450" algn="l" rtl="0">
-              <a:lnSpc>
-                <a:spcPct val="115000"/>
-              </a:lnSpc>
-              <a:spcBef>
-                <a:spcPts val="1600"/>
-              </a:spcBef>
-              <a:spcAft>
-                <a:spcPts val="0"/>
-              </a:spcAft>
-              <a:buClr>
-                <a:schemeClr val="accent1"/>
-              </a:buClr>
-              <a:buSzPts val="1100"/>
-              <a:buFont typeface="Lato"/>
-              <a:buChar char="○"/>
-              <a:defRPr sz="1100" b="0" i="0" u="none" strike="noStrike" cap="none">
-                <a:solidFill>
-                  <a:schemeClr val="accent1"/>
-                </a:solidFill>
-                <a:latin typeface="Lato"/>
-                <a:ea typeface="Lato"/>
-                <a:cs typeface="Lato"/>
-                <a:sym typeface="Lato"/>
-              </a:defRPr>
-            </a:lvl5pPr>
-            <a:lvl6pPr marL="2743200" marR="0" lvl="5" indent="-298450" algn="l" rtl="0">
-              <a:lnSpc>
-                <a:spcPct val="115000"/>
-              </a:lnSpc>
-              <a:spcBef>
-                <a:spcPts val="1600"/>
-              </a:spcBef>
-              <a:spcAft>
-                <a:spcPts val="0"/>
-              </a:spcAft>
-              <a:buClr>
-                <a:schemeClr val="accent1"/>
-              </a:buClr>
-              <a:buSzPts val="1100"/>
-              <a:buFont typeface="Lato"/>
-              <a:buChar char="■"/>
-              <a:defRPr sz="1100" b="0" i="0" u="none" strike="noStrike" cap="none">
-                <a:solidFill>
-                  <a:schemeClr val="accent1"/>
-                </a:solidFill>
-                <a:latin typeface="Lato"/>
-                <a:ea typeface="Lato"/>
-                <a:cs typeface="Lato"/>
-                <a:sym typeface="Lato"/>
-              </a:defRPr>
-            </a:lvl6pPr>
-            <a:lvl7pPr marL="3200400" marR="0" lvl="6" indent="-298450" algn="l" rtl="0">
-              <a:lnSpc>
-                <a:spcPct val="115000"/>
-              </a:lnSpc>
-              <a:spcBef>
-                <a:spcPts val="1600"/>
-              </a:spcBef>
-              <a:spcAft>
-                <a:spcPts val="0"/>
-              </a:spcAft>
-              <a:buClr>
-                <a:schemeClr val="accent1"/>
-              </a:buClr>
-              <a:buSzPts val="1100"/>
-              <a:buFont typeface="Lato"/>
-              <a:buChar char="●"/>
-              <a:defRPr sz="1100" b="0" i="0" u="none" strike="noStrike" cap="none">
-                <a:solidFill>
-                  <a:schemeClr val="accent1"/>
-                </a:solidFill>
-                <a:latin typeface="Lato"/>
-                <a:ea typeface="Lato"/>
-                <a:cs typeface="Lato"/>
-                <a:sym typeface="Lato"/>
-              </a:defRPr>
-            </a:lvl7pPr>
-            <a:lvl8pPr marL="3657600" marR="0" lvl="7" indent="-298450" algn="l" rtl="0">
-              <a:lnSpc>
-                <a:spcPct val="115000"/>
-              </a:lnSpc>
-              <a:spcBef>
-                <a:spcPts val="1600"/>
-              </a:spcBef>
-              <a:spcAft>
-                <a:spcPts val="0"/>
-              </a:spcAft>
-              <a:buClr>
-                <a:schemeClr val="accent1"/>
-              </a:buClr>
-              <a:buSzPts val="1100"/>
-              <a:buFont typeface="Lato"/>
-              <a:buChar char="○"/>
-              <a:defRPr sz="1100" b="0" i="0" u="none" strike="noStrike" cap="none">
-                <a:solidFill>
-                  <a:schemeClr val="accent1"/>
-                </a:solidFill>
-                <a:latin typeface="Lato"/>
-                <a:ea typeface="Lato"/>
-                <a:cs typeface="Lato"/>
-                <a:sym typeface="Lato"/>
-              </a:defRPr>
-            </a:lvl8pPr>
-            <a:lvl9pPr marL="4114800" marR="0" lvl="8" indent="-298450" algn="l" rtl="0">
-              <a:lnSpc>
-                <a:spcPct val="115000"/>
-              </a:lnSpc>
-              <a:spcBef>
-                <a:spcPts val="1600"/>
-              </a:spcBef>
-              <a:spcAft>
-                <a:spcPts val="1600"/>
-              </a:spcAft>
-              <a:buClr>
-                <a:schemeClr val="accent1"/>
-              </a:buClr>
-              <a:buSzPts val="1100"/>
-              <a:buFont typeface="Lato"/>
-              <a:buChar char="■"/>
-              <a:defRPr sz="1100" b="0" i="0" u="none" strike="noStrike" cap="none">
-                <a:solidFill>
-                  <a:schemeClr val="accent1"/>
-                </a:solidFill>
-                <a:latin typeface="Lato"/>
-                <a:ea typeface="Lato"/>
-                <a:cs typeface="Lato"/>
-                <a:sym typeface="Lato"/>
-              </a:defRPr>
-            </a:lvl9pPr>
-          </a:lstStyle>
-          <a:p>
-            <a:pPr marL="146050" indent="0">
-              <a:buNone/>
-            </a:pPr>
-            <a:r>
-              <a:rPr lang="en-US" dirty="0"/>
-              <a:t>Will talk about model performance on this slide</a:t>
-            </a:r>
-          </a:p>
-        </p:txBody>
-      </p:sp>
+      </p:pic>
     </p:spTree>
     <p:custDataLst>
       <p:tags r:id="rId1"/>
@@ -13025,8 +13132,8 @@
         </p:nvSpPr>
         <p:spPr>
           <a:xfrm>
-            <a:off x="725850" y="1761144"/>
-            <a:ext cx="7688700" cy="445028"/>
+            <a:off x="725850" y="1761143"/>
+            <a:ext cx="6561069" cy="3197355"/>
           </a:xfrm>
           <a:prstGeom prst="rect">
             <a:avLst/>
@@ -13292,12 +13399,115 @@
               <a:buNone/>
             </a:pPr>
             <a:r>
+              <a:rPr lang="en-US" u="sng" dirty="0"/>
+              <a:t>Note:	All variables in the model were noted to have statistical significance</a:t>
+            </a:r>
+          </a:p>
+          <a:p>
+            <a:pPr marL="146050" indent="0">
+              <a:buNone/>
+            </a:pPr>
+            <a:endParaRPr lang="en-US" dirty="0"/>
+          </a:p>
+          <a:p>
+            <a:r>
               <a:rPr lang="en-US" dirty="0"/>
-              <a:t>Will talk about model interpretation and inference on this slide</a:t>
+              <a:t>Relative to past failures, previous successful outcomes were associated with a ~1,000% increase in the odds of having another success</a:t>
             </a:r>
+            <a:r>
+              <a:rPr lang="en-US" baseline="30000" dirty="0"/>
+              <a:t>1</a:t>
+            </a:r>
+          </a:p>
+          <a:p>
+            <a:endParaRPr lang="en-US" dirty="0"/>
+          </a:p>
+          <a:p>
+            <a:r>
+              <a:rPr lang="en-US" dirty="0"/>
+              <a:t>Relative to April, the month of March is particularly successful having an ~350% increase in the odds of having success</a:t>
+            </a:r>
+            <a:r>
+              <a:rPr lang="en-US" baseline="30000" dirty="0"/>
+              <a:t>1</a:t>
+            </a:r>
+            <a:endParaRPr lang="en-US" dirty="0"/>
+          </a:p>
+          <a:p>
+            <a:endParaRPr lang="en-US" dirty="0"/>
+          </a:p>
+          <a:p>
+            <a:r>
+              <a:rPr lang="en-US" dirty="0"/>
+              <a:t>Relative to calling on a client’s cell phones, calling their telephone was associated with a ~20% reduction in the odds of having success</a:t>
+            </a:r>
+            <a:r>
+              <a:rPr lang="en-US" baseline="30000" dirty="0"/>
+              <a:t>1</a:t>
+            </a:r>
+            <a:endParaRPr lang="en-US" dirty="0"/>
+          </a:p>
+          <a:p>
+            <a:endParaRPr lang="en-US" dirty="0"/>
+          </a:p>
+          <a:p>
+            <a:r>
+              <a:rPr lang="en-US" dirty="0"/>
+              <a:t>Relative to those clients without housing loans, having a housing loan was associated with a ~60% reduction in the odds of having success</a:t>
+            </a:r>
+            <a:r>
+              <a:rPr lang="en-US" baseline="30000" dirty="0"/>
+              <a:t>1</a:t>
+            </a:r>
+          </a:p>
+          <a:p>
+            <a:pPr marL="146050" indent="0">
+              <a:buNone/>
+            </a:pPr>
+            <a:endParaRPr lang="en-US" baseline="30000" dirty="0"/>
+          </a:p>
+          <a:p>
+            <a:pPr marL="146050" indent="0">
+              <a:buNone/>
+            </a:pPr>
+            <a:r>
+              <a:rPr lang="en-US" baseline="30000" dirty="0"/>
+              <a:t>1 Holding all other variables fixed</a:t>
+            </a:r>
+            <a:endParaRPr lang="en-US" dirty="0"/>
           </a:p>
         </p:txBody>
       </p:sp>
+      <p:pic>
+        <p:nvPicPr>
+          <p:cNvPr id="3" name="Picture 2">
+            <a:extLst>
+              <a:ext uri="{FF2B5EF4-FFF2-40B4-BE49-F238E27FC236}">
+                <a16:creationId xmlns:a16="http://schemas.microsoft.com/office/drawing/2014/main" id="{8C8CB3B1-F276-F041-C9D7-5485DDB0DCF5}"/>
+              </a:ext>
+            </a:extLst>
+          </p:cNvPr>
+          <p:cNvPicPr>
+            <a:picLocks noChangeAspect="1"/>
+          </p:cNvPicPr>
+          <p:nvPr/>
+        </p:nvPicPr>
+        <p:blipFill>
+          <a:blip r:embed="rId4"/>
+          <a:stretch>
+            <a:fillRect/>
+          </a:stretch>
+        </p:blipFill>
+        <p:spPr>
+          <a:xfrm>
+            <a:off x="7286919" y="0"/>
+            <a:ext cx="1602557" cy="5154680"/>
+          </a:xfrm>
+          <a:prstGeom prst="rect">
+            <a:avLst/>
+          </a:prstGeom>
+        </p:spPr>
+      </p:pic>
     </p:spTree>
     <p:custDataLst>
       <p:tags r:id="rId1"/>

</xml_diff>

<commit_message>
Update EDA on Banking.Rmd and ppt slides
</commit_message>
<xml_diff>
--- a/Project2_Chang_Craus_Yule.pptx
+++ b/Project2_Chang_Craus_Yule.pptx
@@ -5,7 +5,7 @@
     <p:sldMasterId id="2147483664" r:id="rId1"/>
   </p:sldMasterIdLst>
   <p:notesMasterIdLst>
-    <p:notesMasterId r:id="rId17"/>
+    <p:notesMasterId r:id="rId19"/>
   </p:notesMasterIdLst>
   <p:sldIdLst>
     <p:sldId id="256" r:id="rId2"/>
@@ -16,30 +16,32 @@
     <p:sldId id="278" r:id="rId7"/>
     <p:sldId id="301" r:id="rId8"/>
     <p:sldId id="302" r:id="rId9"/>
-    <p:sldId id="293" r:id="rId10"/>
-    <p:sldId id="294" r:id="rId11"/>
-    <p:sldId id="303" r:id="rId12"/>
-    <p:sldId id="304" r:id="rId13"/>
-    <p:sldId id="305" r:id="rId14"/>
-    <p:sldId id="300" r:id="rId15"/>
-    <p:sldId id="275" r:id="rId16"/>
+    <p:sldId id="306" r:id="rId10"/>
+    <p:sldId id="308" r:id="rId11"/>
+    <p:sldId id="293" r:id="rId12"/>
+    <p:sldId id="294" r:id="rId13"/>
+    <p:sldId id="303" r:id="rId14"/>
+    <p:sldId id="304" r:id="rId15"/>
+    <p:sldId id="305" r:id="rId16"/>
+    <p:sldId id="300" r:id="rId17"/>
+    <p:sldId id="275" r:id="rId18"/>
   </p:sldIdLst>
   <p:sldSz cx="9144000" cy="5143500" type="screen16x9"/>
   <p:notesSz cx="6858000" cy="9144000"/>
   <p:embeddedFontLst>
     <p:embeddedFont>
       <p:font typeface="Lato" panose="020F0502020204030203" pitchFamily="34" charset="0"/>
-      <p:regular r:id="rId18"/>
-      <p:bold r:id="rId19"/>
-      <p:italic r:id="rId20"/>
-      <p:boldItalic r:id="rId21"/>
+      <p:regular r:id="rId20"/>
+      <p:bold r:id="rId21"/>
+      <p:italic r:id="rId22"/>
+      <p:boldItalic r:id="rId23"/>
     </p:embeddedFont>
     <p:embeddedFont>
-      <p:font typeface="Raleway" pitchFamily="2" charset="77"/>
-      <p:regular r:id="rId22"/>
-      <p:bold r:id="rId23"/>
-      <p:italic r:id="rId24"/>
-      <p:boldItalic r:id="rId25"/>
+      <p:font typeface="Raleway" pitchFamily="2" charset="0"/>
+      <p:regular r:id="rId24"/>
+      <p:bold r:id="rId25"/>
+      <p:italic r:id="rId26"/>
+      <p:boldItalic r:id="rId27"/>
     </p:embeddedFont>
   </p:embeddedFontLst>
   <p:defaultTextStyle>
@@ -288,6 +290,113 @@
     </p:ext>
   </p:extLst>
 </p:presentation>
+</file>
+
+<file path=ppt/revisionInfo.xml><?xml version="1.0" encoding="utf-8"?>
+<p1510:revInfo xmlns:a="http://schemas.openxmlformats.org/drawingml/2006/main" xmlns:r="http://schemas.openxmlformats.org/officeDocument/2006/relationships" xmlns:p1510="http://schemas.microsoft.com/office/powerpoint/2015/10/main">
+  <p1510:revLst>
+    <p1510:client id="{32165585-CB35-4C33-B919-9B0DD83E6E32}" v="7" dt="2023-04-10T20:49:30.756"/>
+  </p1510:revLst>
+</p1510:revInfo>
+</file>
+
+<file path=ppt/changesInfos/changesInfo1.xml><?xml version="1.0" encoding="utf-8"?>
+<pc:chgInfo xmlns:a="http://schemas.openxmlformats.org/drawingml/2006/main" xmlns:r="http://schemas.openxmlformats.org/officeDocument/2006/relationships" xmlns:ac="http://schemas.microsoft.com/office/drawing/2013/main/command" xmlns:pc="http://schemas.microsoft.com/office/powerpoint/2013/main/command">
+  <pc:docChgLst>
+    <pc:chgData name="Carolina Craus" userId="bae62b9d695bbdd6" providerId="LiveId" clId="{32165585-CB35-4C33-B919-9B0DD83E6E32}"/>
+    <pc:docChg chg="custSel addSld delSld modSld sldOrd">
+      <pc:chgData name="Carolina Craus" userId="bae62b9d695bbdd6" providerId="LiveId" clId="{32165585-CB35-4C33-B919-9B0DD83E6E32}" dt="2023-04-10T20:54:32.530" v="724" actId="20577"/>
+      <pc:docMkLst>
+        <pc:docMk/>
+      </pc:docMkLst>
+      <pc:sldChg chg="modSp add mod">
+        <pc:chgData name="Carolina Craus" userId="bae62b9d695bbdd6" providerId="LiveId" clId="{32165585-CB35-4C33-B919-9B0DD83E6E32}" dt="2023-04-10T20:41:36.749" v="156" actId="20577"/>
+        <pc:sldMkLst>
+          <pc:docMk/>
+          <pc:sldMk cId="3579624159" sldId="306"/>
+        </pc:sldMkLst>
+        <pc:spChg chg="mod">
+          <ac:chgData name="Carolina Craus" userId="bae62b9d695bbdd6" providerId="LiveId" clId="{32165585-CB35-4C33-B919-9B0DD83E6E32}" dt="2023-04-10T20:41:36.749" v="156" actId="20577"/>
+          <ac:spMkLst>
+            <pc:docMk/>
+            <pc:sldMk cId="3579624159" sldId="306"/>
+            <ac:spMk id="8" creationId="{3B13F08B-AEE4-4C95-21B6-8DF753ECA5AD}"/>
+          </ac:spMkLst>
+        </pc:spChg>
+        <pc:picChg chg="mod">
+          <ac:chgData name="Carolina Craus" userId="bae62b9d695bbdd6" providerId="LiveId" clId="{32165585-CB35-4C33-B919-9B0DD83E6E32}" dt="2023-04-10T20:38:47.846" v="3" actId="1076"/>
+          <ac:picMkLst>
+            <pc:docMk/>
+            <pc:sldMk cId="3579624159" sldId="306"/>
+            <ac:picMk id="6" creationId="{A69CA1BE-4C1B-E253-6B46-329807C1BD0B}"/>
+          </ac:picMkLst>
+        </pc:picChg>
+      </pc:sldChg>
+      <pc:sldChg chg="new del">
+        <pc:chgData name="Carolina Craus" userId="bae62b9d695bbdd6" providerId="LiveId" clId="{32165585-CB35-4C33-B919-9B0DD83E6E32}" dt="2023-04-10T20:41:57.868" v="161" actId="47"/>
+        <pc:sldMkLst>
+          <pc:docMk/>
+          <pc:sldMk cId="2196822164" sldId="307"/>
+        </pc:sldMkLst>
+      </pc:sldChg>
+      <pc:sldChg chg="addSp delSp modSp add mod ord">
+        <pc:chgData name="Carolina Craus" userId="bae62b9d695bbdd6" providerId="LiveId" clId="{32165585-CB35-4C33-B919-9B0DD83E6E32}" dt="2023-04-10T20:54:32.530" v="724" actId="20577"/>
+        <pc:sldMkLst>
+          <pc:docMk/>
+          <pc:sldMk cId="3004351000" sldId="308"/>
+        </pc:sldMkLst>
+        <pc:spChg chg="mod">
+          <ac:chgData name="Carolina Craus" userId="bae62b9d695bbdd6" providerId="LiveId" clId="{32165585-CB35-4C33-B919-9B0DD83E6E32}" dt="2023-04-10T20:48:06.490" v="167" actId="20577"/>
+          <ac:spMkLst>
+            <pc:docMk/>
+            <pc:sldMk cId="3004351000" sldId="308"/>
+            <ac:spMk id="2" creationId="{8B170740-DB3F-076A-A2D2-9555F51D2D32}"/>
+          </ac:spMkLst>
+        </pc:spChg>
+        <pc:spChg chg="add del">
+          <ac:chgData name="Carolina Craus" userId="bae62b9d695bbdd6" providerId="LiveId" clId="{32165585-CB35-4C33-B919-9B0DD83E6E32}" dt="2023-04-10T20:48:13.493" v="170"/>
+          <ac:spMkLst>
+            <pc:docMk/>
+            <pc:sldMk cId="3004351000" sldId="308"/>
+            <ac:spMk id="3" creationId="{C1E5DA3E-87D7-2330-3EA3-55D7CACD04F0}"/>
+          </ac:spMkLst>
+        </pc:spChg>
+        <pc:spChg chg="add del">
+          <ac:chgData name="Carolina Craus" userId="bae62b9d695bbdd6" providerId="LiveId" clId="{32165585-CB35-4C33-B919-9B0DD83E6E32}" dt="2023-04-10T20:49:30.750" v="181"/>
+          <ac:spMkLst>
+            <pc:docMk/>
+            <pc:sldMk cId="3004351000" sldId="308"/>
+            <ac:spMk id="5" creationId="{B411D211-68A9-5947-311C-AFE62EB25F2C}"/>
+          </ac:spMkLst>
+        </pc:spChg>
+        <pc:spChg chg="mod">
+          <ac:chgData name="Carolina Craus" userId="bae62b9d695bbdd6" providerId="LiveId" clId="{32165585-CB35-4C33-B919-9B0DD83E6E32}" dt="2023-04-10T20:54:32.530" v="724" actId="20577"/>
+          <ac:spMkLst>
+            <pc:docMk/>
+            <pc:sldMk cId="3004351000" sldId="308"/>
+            <ac:spMk id="8" creationId="{3B13F08B-AEE4-4C95-21B6-8DF753ECA5AD}"/>
+          </ac:spMkLst>
+        </pc:spChg>
+        <pc:picChg chg="add del mod">
+          <ac:chgData name="Carolina Craus" userId="bae62b9d695bbdd6" providerId="LiveId" clId="{32165585-CB35-4C33-B919-9B0DD83E6E32}" dt="2023-04-10T20:49:13.766" v="179" actId="478"/>
+          <ac:picMkLst>
+            <pc:docMk/>
+            <pc:sldMk cId="3004351000" sldId="308"/>
+            <ac:picMk id="4" creationId="{1307027A-FCC3-05E0-41FE-33BF2E9DAEDD}"/>
+          </ac:picMkLst>
+        </pc:picChg>
+        <pc:picChg chg="add mod">
+          <ac:chgData name="Carolina Craus" userId="bae62b9d695bbdd6" providerId="LiveId" clId="{32165585-CB35-4C33-B919-9B0DD83E6E32}" dt="2023-04-10T20:49:38.648" v="185" actId="1076"/>
+          <ac:picMkLst>
+            <pc:docMk/>
+            <pc:sldMk cId="3004351000" sldId="308"/>
+            <ac:picMk id="6" creationId="{92F350EB-A179-C072-4BB8-1935AE3A0486}"/>
+          </ac:picMkLst>
+        </pc:picChg>
+      </pc:sldChg>
+    </pc:docChg>
+  </pc:docChgLst>
+</pc:chgInfo>
 </file>
 
 <file path=ppt/notesMasters/notesMaster1.xml><?xml version="1.0" encoding="utf-8"?>
@@ -894,7 +1003,7 @@
     </p:spTree>
     <p:extLst>
       <p:ext uri="{BB962C8B-B14F-4D97-AF65-F5344CB8AC3E}">
-        <p14:creationId xmlns:p14="http://schemas.microsoft.com/office/powerpoint/2010/main" val="579046869"/>
+        <p14:creationId xmlns:p14="http://schemas.microsoft.com/office/powerpoint/2010/main" val="2941158821"/>
       </p:ext>
     </p:extLst>
   </p:cSld>
@@ -963,7 +1072,7 @@
     </p:spTree>
     <p:extLst>
       <p:ext uri="{BB962C8B-B14F-4D97-AF65-F5344CB8AC3E}">
-        <p14:creationId xmlns:p14="http://schemas.microsoft.com/office/powerpoint/2010/main" val="1994813416"/>
+        <p14:creationId xmlns:p14="http://schemas.microsoft.com/office/powerpoint/2010/main" val="3868119659"/>
       </p:ext>
     </p:extLst>
   </p:cSld>
@@ -1032,7 +1141,7 @@
     </p:spTree>
     <p:extLst>
       <p:ext uri="{BB962C8B-B14F-4D97-AF65-F5344CB8AC3E}">
-        <p14:creationId xmlns:p14="http://schemas.microsoft.com/office/powerpoint/2010/main" val="2131577643"/>
+        <p14:creationId xmlns:p14="http://schemas.microsoft.com/office/powerpoint/2010/main" val="579046869"/>
       </p:ext>
     </p:extLst>
   </p:cSld>
@@ -1101,7 +1210,7 @@
     </p:spTree>
     <p:extLst>
       <p:ext uri="{BB962C8B-B14F-4D97-AF65-F5344CB8AC3E}">
-        <p14:creationId xmlns:p14="http://schemas.microsoft.com/office/powerpoint/2010/main" val="3189567172"/>
+        <p14:creationId xmlns:p14="http://schemas.microsoft.com/office/powerpoint/2010/main" val="1994813416"/>
       </p:ext>
     </p:extLst>
   </p:cSld>
@@ -1170,6 +1279,144 @@
     </p:spTree>
     <p:extLst>
       <p:ext uri="{BB962C8B-B14F-4D97-AF65-F5344CB8AC3E}">
+        <p14:creationId xmlns:p14="http://schemas.microsoft.com/office/powerpoint/2010/main" val="2131577643"/>
+      </p:ext>
+    </p:extLst>
+  </p:cSld>
+  <p:clrMapOvr>
+    <a:masterClrMapping/>
+  </p:clrMapOvr>
+</p:notes>
+</file>
+
+<file path=ppt/notesSlides/notesSlide15.xml><?xml version="1.0" encoding="utf-8"?>
+<p:notes xmlns:a="http://schemas.openxmlformats.org/drawingml/2006/main" xmlns:r="http://schemas.openxmlformats.org/officeDocument/2006/relationships" xmlns:p="http://schemas.openxmlformats.org/presentationml/2006/main">
+  <p:cSld>
+    <p:spTree>
+      <p:nvGrpSpPr>
+        <p:cNvPr id="1" name=""/>
+        <p:cNvGrpSpPr/>
+        <p:nvPr/>
+      </p:nvGrpSpPr>
+      <p:grpSpPr>
+        <a:xfrm>
+          <a:off x="0" y="0"/>
+          <a:ext cx="0" cy="0"/>
+          <a:chOff x="0" y="0"/>
+          <a:chExt cx="0" cy="0"/>
+        </a:xfrm>
+      </p:grpSpPr>
+      <p:sp>
+        <p:nvSpPr>
+          <p:cNvPr id="2" name="Slide Image Placeholder 1"/>
+          <p:cNvSpPr>
+            <a:spLocks noGrp="1" noRot="1" noChangeAspect="1"/>
+          </p:cNvSpPr>
+          <p:nvPr>
+            <p:ph type="sldImg"/>
+          </p:nvPr>
+        </p:nvSpPr>
+        <p:spPr>
+          <a:xfrm>
+            <a:off x="381000" y="685800"/>
+            <a:ext cx="6096000" cy="3429000"/>
+          </a:xfrm>
+        </p:spPr>
+      </p:sp>
+      <p:sp>
+        <p:nvSpPr>
+          <p:cNvPr id="3" name="Notes Placeholder 2"/>
+          <p:cNvSpPr>
+            <a:spLocks noGrp="1"/>
+          </p:cNvSpPr>
+          <p:nvPr>
+            <p:ph type="body" idx="1"/>
+          </p:nvPr>
+        </p:nvSpPr>
+        <p:spPr/>
+        <p:txBody>
+          <a:bodyPr/>
+          <a:lstStyle/>
+          <a:p>
+            <a:pPr marL="139700" indent="0">
+              <a:buNone/>
+            </a:pPr>
+            <a:endParaRPr lang="en-US" dirty="0"/>
+          </a:p>
+        </p:txBody>
+      </p:sp>
+    </p:spTree>
+    <p:extLst>
+      <p:ext uri="{BB962C8B-B14F-4D97-AF65-F5344CB8AC3E}">
+        <p14:creationId xmlns:p14="http://schemas.microsoft.com/office/powerpoint/2010/main" val="3189567172"/>
+      </p:ext>
+    </p:extLst>
+  </p:cSld>
+  <p:clrMapOvr>
+    <a:masterClrMapping/>
+  </p:clrMapOvr>
+</p:notes>
+</file>
+
+<file path=ppt/notesSlides/notesSlide16.xml><?xml version="1.0" encoding="utf-8"?>
+<p:notes xmlns:a="http://schemas.openxmlformats.org/drawingml/2006/main" xmlns:r="http://schemas.openxmlformats.org/officeDocument/2006/relationships" xmlns:p="http://schemas.openxmlformats.org/presentationml/2006/main">
+  <p:cSld>
+    <p:spTree>
+      <p:nvGrpSpPr>
+        <p:cNvPr id="1" name=""/>
+        <p:cNvGrpSpPr/>
+        <p:nvPr/>
+      </p:nvGrpSpPr>
+      <p:grpSpPr>
+        <a:xfrm>
+          <a:off x="0" y="0"/>
+          <a:ext cx="0" cy="0"/>
+          <a:chOff x="0" y="0"/>
+          <a:chExt cx="0" cy="0"/>
+        </a:xfrm>
+      </p:grpSpPr>
+      <p:sp>
+        <p:nvSpPr>
+          <p:cNvPr id="2" name="Slide Image Placeholder 1"/>
+          <p:cNvSpPr>
+            <a:spLocks noGrp="1" noRot="1" noChangeAspect="1"/>
+          </p:cNvSpPr>
+          <p:nvPr>
+            <p:ph type="sldImg"/>
+          </p:nvPr>
+        </p:nvSpPr>
+        <p:spPr>
+          <a:xfrm>
+            <a:off x="381000" y="685800"/>
+            <a:ext cx="6096000" cy="3429000"/>
+          </a:xfrm>
+        </p:spPr>
+      </p:sp>
+      <p:sp>
+        <p:nvSpPr>
+          <p:cNvPr id="3" name="Notes Placeholder 2"/>
+          <p:cNvSpPr>
+            <a:spLocks noGrp="1"/>
+          </p:cNvSpPr>
+          <p:nvPr>
+            <p:ph type="body" idx="1"/>
+          </p:nvPr>
+        </p:nvSpPr>
+        <p:spPr/>
+        <p:txBody>
+          <a:bodyPr/>
+          <a:lstStyle/>
+          <a:p>
+            <a:pPr marL="139700" indent="0">
+              <a:buNone/>
+            </a:pPr>
+            <a:endParaRPr lang="en-US" dirty="0"/>
+          </a:p>
+        </p:txBody>
+      </p:sp>
+    </p:spTree>
+    <p:extLst>
+      <p:ext uri="{BB962C8B-B14F-4D97-AF65-F5344CB8AC3E}">
         <p14:creationId xmlns:p14="http://schemas.microsoft.com/office/powerpoint/2010/main" val="1238886777"/>
       </p:ext>
     </p:extLst>
@@ -1180,7 +1427,7 @@
 </p:notes>
 </file>
 
-<file path=ppt/notesSlides/notesSlide15.xml><?xml version="1.0" encoding="utf-8"?>
+<file path=ppt/notesSlides/notesSlide17.xml><?xml version="1.0" encoding="utf-8"?>
 <p:notes xmlns:a="http://schemas.openxmlformats.org/drawingml/2006/main" xmlns:r="http://schemas.openxmlformats.org/officeDocument/2006/relationships" xmlns:p="http://schemas.openxmlformats.org/presentationml/2006/main" showMasterSp="0" showMasterPhAnim="0">
   <p:cSld>
     <p:spTree>
@@ -1896,7 +2143,7 @@
     </p:spTree>
     <p:extLst>
       <p:ext uri="{BB962C8B-B14F-4D97-AF65-F5344CB8AC3E}">
-        <p14:creationId xmlns:p14="http://schemas.microsoft.com/office/powerpoint/2010/main" val="3868119659"/>
+        <p14:creationId xmlns:p14="http://schemas.microsoft.com/office/powerpoint/2010/main" val="1503410463"/>
       </p:ext>
     </p:extLst>
   </p:cSld>
@@ -11169,6 +11416,508 @@
                 <a:latin typeface="Raleway"/>
                 <a:sym typeface="Raleway"/>
               </a:rPr>
+              <a:t>Exploratory Data Analysis</a:t>
+            </a:r>
+          </a:p>
+          <a:p>
+            <a:pPr marL="146050" indent="0">
+              <a:buNone/>
+            </a:pPr>
+            <a:r>
+              <a:rPr lang="en-US" dirty="0">
+                <a:solidFill>
+                  <a:schemeClr val="bg1">
+                    <a:lumMod val="65000"/>
+                  </a:schemeClr>
+                </a:solidFill>
+              </a:rPr>
+              <a:t>Relationship between Month and Y</a:t>
+            </a:r>
+          </a:p>
+        </p:txBody>
+      </p:sp>
+      <p:sp>
+        <p:nvSpPr>
+          <p:cNvPr id="8" name="Text Placeholder 2">
+            <a:extLst>
+              <a:ext uri="{FF2B5EF4-FFF2-40B4-BE49-F238E27FC236}">
+                <a16:creationId xmlns:a16="http://schemas.microsoft.com/office/drawing/2014/main" id="{3B13F08B-AEE4-4C95-21B6-8DF753ECA5AD}"/>
+              </a:ext>
+            </a:extLst>
+          </p:cNvPr>
+          <p:cNvSpPr txBox="1">
+            <a:spLocks/>
+          </p:cNvSpPr>
+          <p:nvPr/>
+        </p:nvSpPr>
+        <p:spPr>
+          <a:xfrm>
+            <a:off x="285226" y="1761143"/>
+            <a:ext cx="3196205" cy="2655613"/>
+          </a:xfrm>
+          <a:prstGeom prst="rect">
+            <a:avLst/>
+          </a:prstGeom>
+          <a:noFill/>
+          <a:ln>
+            <a:noFill/>
+          </a:ln>
+        </p:spPr>
+        <p:txBody>
+          <a:bodyPr spcFirstLastPara="1" wrap="square" lIns="91425" tIns="91425" rIns="91425" bIns="91425" anchor="t" anchorCtr="0">
+            <a:noAutofit/>
+          </a:bodyPr>
+          <a:lstStyle>
+            <a:defPPr marR="0" lvl="0" algn="l" rtl="0">
+              <a:lnSpc>
+                <a:spcPct val="100000"/>
+              </a:lnSpc>
+              <a:spcBef>
+                <a:spcPts val="0"/>
+              </a:spcBef>
+              <a:spcAft>
+                <a:spcPts val="0"/>
+              </a:spcAft>
+            </a:defPPr>
+            <a:lvl1pPr marL="457200" marR="0" lvl="0" indent="-311150" algn="l" rtl="0">
+              <a:lnSpc>
+                <a:spcPct val="115000"/>
+              </a:lnSpc>
+              <a:spcBef>
+                <a:spcPts val="0"/>
+              </a:spcBef>
+              <a:spcAft>
+                <a:spcPts val="0"/>
+              </a:spcAft>
+              <a:buClr>
+                <a:schemeClr val="accent1"/>
+              </a:buClr>
+              <a:buSzPts val="1300"/>
+              <a:buFont typeface="Lato"/>
+              <a:buChar char="●"/>
+              <a:defRPr sz="1300" b="0" i="0" u="none" strike="noStrike" cap="none">
+                <a:solidFill>
+                  <a:schemeClr val="accent1"/>
+                </a:solidFill>
+                <a:latin typeface="Lato"/>
+                <a:ea typeface="Lato"/>
+                <a:cs typeface="Lato"/>
+                <a:sym typeface="Lato"/>
+              </a:defRPr>
+            </a:lvl1pPr>
+            <a:lvl2pPr marL="914400" marR="0" lvl="1" indent="-298450" algn="l" rtl="0">
+              <a:lnSpc>
+                <a:spcPct val="115000"/>
+              </a:lnSpc>
+              <a:spcBef>
+                <a:spcPts val="1600"/>
+              </a:spcBef>
+              <a:spcAft>
+                <a:spcPts val="0"/>
+              </a:spcAft>
+              <a:buClr>
+                <a:schemeClr val="accent1"/>
+              </a:buClr>
+              <a:buSzPts val="1100"/>
+              <a:buFont typeface="Lato"/>
+              <a:buChar char="○"/>
+              <a:defRPr sz="1100" b="0" i="0" u="none" strike="noStrike" cap="none">
+                <a:solidFill>
+                  <a:schemeClr val="accent1"/>
+                </a:solidFill>
+                <a:latin typeface="Lato"/>
+                <a:ea typeface="Lato"/>
+                <a:cs typeface="Lato"/>
+                <a:sym typeface="Lato"/>
+              </a:defRPr>
+            </a:lvl2pPr>
+            <a:lvl3pPr marL="1371600" marR="0" lvl="2" indent="-298450" algn="l" rtl="0">
+              <a:lnSpc>
+                <a:spcPct val="115000"/>
+              </a:lnSpc>
+              <a:spcBef>
+                <a:spcPts val="1600"/>
+              </a:spcBef>
+              <a:spcAft>
+                <a:spcPts val="0"/>
+              </a:spcAft>
+              <a:buClr>
+                <a:schemeClr val="accent1"/>
+              </a:buClr>
+              <a:buSzPts val="1100"/>
+              <a:buFont typeface="Lato"/>
+              <a:buChar char="■"/>
+              <a:defRPr sz="1100" b="0" i="0" u="none" strike="noStrike" cap="none">
+                <a:solidFill>
+                  <a:schemeClr val="accent1"/>
+                </a:solidFill>
+                <a:latin typeface="Lato"/>
+                <a:ea typeface="Lato"/>
+                <a:cs typeface="Lato"/>
+                <a:sym typeface="Lato"/>
+              </a:defRPr>
+            </a:lvl3pPr>
+            <a:lvl4pPr marL="1828800" marR="0" lvl="3" indent="-298450" algn="l" rtl="0">
+              <a:lnSpc>
+                <a:spcPct val="115000"/>
+              </a:lnSpc>
+              <a:spcBef>
+                <a:spcPts val="1600"/>
+              </a:spcBef>
+              <a:spcAft>
+                <a:spcPts val="0"/>
+              </a:spcAft>
+              <a:buClr>
+                <a:schemeClr val="accent1"/>
+              </a:buClr>
+              <a:buSzPts val="1100"/>
+              <a:buFont typeface="Lato"/>
+              <a:buChar char="●"/>
+              <a:defRPr sz="1100" b="0" i="0" u="none" strike="noStrike" cap="none">
+                <a:solidFill>
+                  <a:schemeClr val="accent1"/>
+                </a:solidFill>
+                <a:latin typeface="Lato"/>
+                <a:ea typeface="Lato"/>
+                <a:cs typeface="Lato"/>
+                <a:sym typeface="Lato"/>
+              </a:defRPr>
+            </a:lvl4pPr>
+            <a:lvl5pPr marL="2286000" marR="0" lvl="4" indent="-298450" algn="l" rtl="0">
+              <a:lnSpc>
+                <a:spcPct val="115000"/>
+              </a:lnSpc>
+              <a:spcBef>
+                <a:spcPts val="1600"/>
+              </a:spcBef>
+              <a:spcAft>
+                <a:spcPts val="0"/>
+              </a:spcAft>
+              <a:buClr>
+                <a:schemeClr val="accent1"/>
+              </a:buClr>
+              <a:buSzPts val="1100"/>
+              <a:buFont typeface="Lato"/>
+              <a:buChar char="○"/>
+              <a:defRPr sz="1100" b="0" i="0" u="none" strike="noStrike" cap="none">
+                <a:solidFill>
+                  <a:schemeClr val="accent1"/>
+                </a:solidFill>
+                <a:latin typeface="Lato"/>
+                <a:ea typeface="Lato"/>
+                <a:cs typeface="Lato"/>
+                <a:sym typeface="Lato"/>
+              </a:defRPr>
+            </a:lvl5pPr>
+            <a:lvl6pPr marL="2743200" marR="0" lvl="5" indent="-298450" algn="l" rtl="0">
+              <a:lnSpc>
+                <a:spcPct val="115000"/>
+              </a:lnSpc>
+              <a:spcBef>
+                <a:spcPts val="1600"/>
+              </a:spcBef>
+              <a:spcAft>
+                <a:spcPts val="0"/>
+              </a:spcAft>
+              <a:buClr>
+                <a:schemeClr val="accent1"/>
+              </a:buClr>
+              <a:buSzPts val="1100"/>
+              <a:buFont typeface="Lato"/>
+              <a:buChar char="■"/>
+              <a:defRPr sz="1100" b="0" i="0" u="none" strike="noStrike" cap="none">
+                <a:solidFill>
+                  <a:schemeClr val="accent1"/>
+                </a:solidFill>
+                <a:latin typeface="Lato"/>
+                <a:ea typeface="Lato"/>
+                <a:cs typeface="Lato"/>
+                <a:sym typeface="Lato"/>
+              </a:defRPr>
+            </a:lvl6pPr>
+            <a:lvl7pPr marL="3200400" marR="0" lvl="6" indent="-298450" algn="l" rtl="0">
+              <a:lnSpc>
+                <a:spcPct val="115000"/>
+              </a:lnSpc>
+              <a:spcBef>
+                <a:spcPts val="1600"/>
+              </a:spcBef>
+              <a:spcAft>
+                <a:spcPts val="0"/>
+              </a:spcAft>
+              <a:buClr>
+                <a:schemeClr val="accent1"/>
+              </a:buClr>
+              <a:buSzPts val="1100"/>
+              <a:buFont typeface="Lato"/>
+              <a:buChar char="●"/>
+              <a:defRPr sz="1100" b="0" i="0" u="none" strike="noStrike" cap="none">
+                <a:solidFill>
+                  <a:schemeClr val="accent1"/>
+                </a:solidFill>
+                <a:latin typeface="Lato"/>
+                <a:ea typeface="Lato"/>
+                <a:cs typeface="Lato"/>
+                <a:sym typeface="Lato"/>
+              </a:defRPr>
+            </a:lvl7pPr>
+            <a:lvl8pPr marL="3657600" marR="0" lvl="7" indent="-298450" algn="l" rtl="0">
+              <a:lnSpc>
+                <a:spcPct val="115000"/>
+              </a:lnSpc>
+              <a:spcBef>
+                <a:spcPts val="1600"/>
+              </a:spcBef>
+              <a:spcAft>
+                <a:spcPts val="0"/>
+              </a:spcAft>
+              <a:buClr>
+                <a:schemeClr val="accent1"/>
+              </a:buClr>
+              <a:buSzPts val="1100"/>
+              <a:buFont typeface="Lato"/>
+              <a:buChar char="○"/>
+              <a:defRPr sz="1100" b="0" i="0" u="none" strike="noStrike" cap="none">
+                <a:solidFill>
+                  <a:schemeClr val="accent1"/>
+                </a:solidFill>
+                <a:latin typeface="Lato"/>
+                <a:ea typeface="Lato"/>
+                <a:cs typeface="Lato"/>
+                <a:sym typeface="Lato"/>
+              </a:defRPr>
+            </a:lvl8pPr>
+            <a:lvl9pPr marL="4114800" marR="0" lvl="8" indent="-298450" algn="l" rtl="0">
+              <a:lnSpc>
+                <a:spcPct val="115000"/>
+              </a:lnSpc>
+              <a:spcBef>
+                <a:spcPts val="1600"/>
+              </a:spcBef>
+              <a:spcAft>
+                <a:spcPts val="1600"/>
+              </a:spcAft>
+              <a:buClr>
+                <a:schemeClr val="accent1"/>
+              </a:buClr>
+              <a:buSzPts val="1100"/>
+              <a:buFont typeface="Lato"/>
+              <a:buChar char="■"/>
+              <a:defRPr sz="1100" b="0" i="0" u="none" strike="noStrike" cap="none">
+                <a:solidFill>
+                  <a:schemeClr val="accent1"/>
+                </a:solidFill>
+                <a:latin typeface="Lato"/>
+                <a:ea typeface="Lato"/>
+                <a:cs typeface="Lato"/>
+                <a:sym typeface="Lato"/>
+              </a:defRPr>
+            </a:lvl9pPr>
+          </a:lstStyle>
+          <a:p>
+            <a:pPr marL="146050" indent="0">
+              <a:buNone/>
+            </a:pPr>
+            <a:r>
+              <a:rPr lang="en-US" dirty="0"/>
+              <a:t>Month seems to impact whether a client will resubscribe to a term deposit </a:t>
+            </a:r>
+          </a:p>
+          <a:p>
+            <a:pPr marL="146050" indent="0">
+              <a:buNone/>
+            </a:pPr>
+            <a:endParaRPr lang="en-US" dirty="0"/>
+          </a:p>
+          <a:p>
+            <a:r>
+              <a:rPr lang="en-US" dirty="0"/>
+              <a:t>September, October, December, and March seem to have almost half the clients resubscribe to a term deposit </a:t>
+            </a:r>
+          </a:p>
+          <a:p>
+            <a:r>
+              <a:rPr lang="en-US" dirty="0"/>
+              <a:t>The rest of the months have </a:t>
+            </a:r>
+            <a:r>
+              <a:rPr lang="en-US"/>
+              <a:t>less than </a:t>
+            </a:r>
+            <a:r>
+              <a:rPr lang="en-US" dirty="0"/>
+              <a:t>25% rate of resubscribing to a term deposit </a:t>
+            </a:r>
+          </a:p>
+          <a:p>
+            <a:endParaRPr lang="en-US" dirty="0"/>
+          </a:p>
+        </p:txBody>
+      </p:sp>
+      <p:pic>
+        <p:nvPicPr>
+          <p:cNvPr id="6" name="Picture 5">
+            <a:extLst>
+              <a:ext uri="{FF2B5EF4-FFF2-40B4-BE49-F238E27FC236}">
+                <a16:creationId xmlns:a16="http://schemas.microsoft.com/office/drawing/2014/main" id="{92F350EB-A179-C072-4BB8-1935AE3A0486}"/>
+              </a:ext>
+            </a:extLst>
+          </p:cNvPr>
+          <p:cNvPicPr>
+            <a:picLocks noChangeAspect="1"/>
+          </p:cNvPicPr>
+          <p:nvPr/>
+        </p:nvPicPr>
+        <p:blipFill>
+          <a:blip r:embed="rId4"/>
+          <a:stretch>
+            <a:fillRect/>
+          </a:stretch>
+        </p:blipFill>
+        <p:spPr>
+          <a:xfrm>
+            <a:off x="3728898" y="1417194"/>
+            <a:ext cx="5478173" cy="3382357"/>
+          </a:xfrm>
+          <a:prstGeom prst="rect">
+            <a:avLst/>
+          </a:prstGeom>
+        </p:spPr>
+      </p:pic>
+    </p:spTree>
+    <p:custDataLst>
+      <p:tags r:id="rId1"/>
+    </p:custDataLst>
+    <p:extLst>
+      <p:ext uri="{BB962C8B-B14F-4D97-AF65-F5344CB8AC3E}">
+        <p14:creationId xmlns:p14="http://schemas.microsoft.com/office/powerpoint/2010/main" val="3004351000"/>
+      </p:ext>
+    </p:extLst>
+  </p:cSld>
+  <p:clrMapOvr>
+    <a:masterClrMapping/>
+  </p:clrMapOvr>
+</p:sld>
+</file>
+
+<file path=ppt/slides/slide11.xml><?xml version="1.0" encoding="utf-8"?>
+<p:sld xmlns:a="http://schemas.openxmlformats.org/drawingml/2006/main" xmlns:r="http://schemas.openxmlformats.org/officeDocument/2006/relationships" xmlns:p="http://schemas.openxmlformats.org/presentationml/2006/main">
+  <p:cSld>
+    <p:spTree>
+      <p:nvGrpSpPr>
+        <p:cNvPr id="1" name=""/>
+        <p:cNvGrpSpPr/>
+        <p:nvPr/>
+      </p:nvGrpSpPr>
+      <p:grpSpPr>
+        <a:xfrm>
+          <a:off x="0" y="0"/>
+          <a:ext cx="0" cy="0"/>
+          <a:chOff x="0" y="0"/>
+          <a:chExt cx="0" cy="0"/>
+        </a:xfrm>
+      </p:grpSpPr>
+      <p:sp>
+        <p:nvSpPr>
+          <p:cNvPr id="2" name="Title 1">
+            <a:extLst>
+              <a:ext uri="{FF2B5EF4-FFF2-40B4-BE49-F238E27FC236}">
+                <a16:creationId xmlns:a16="http://schemas.microsoft.com/office/drawing/2014/main" id="{D1544AB8-4CAC-56EE-6EF0-25499C370501}"/>
+              </a:ext>
+            </a:extLst>
+          </p:cNvPr>
+          <p:cNvSpPr>
+            <a:spLocks noGrp="1"/>
+          </p:cNvSpPr>
+          <p:nvPr>
+            <p:ph type="ctrTitle"/>
+          </p:nvPr>
+        </p:nvSpPr>
+        <p:spPr/>
+        <p:txBody>
+          <a:bodyPr/>
+          <a:lstStyle/>
+          <a:p>
+            <a:r>
+              <a:rPr lang="en-US" dirty="0"/>
+              <a:t>Objective 1</a:t>
+            </a:r>
+          </a:p>
+        </p:txBody>
+      </p:sp>
+    </p:spTree>
+    <p:extLst>
+      <p:ext uri="{BB962C8B-B14F-4D97-AF65-F5344CB8AC3E}">
+        <p14:creationId xmlns:p14="http://schemas.microsoft.com/office/powerpoint/2010/main" val="3764461431"/>
+      </p:ext>
+    </p:extLst>
+  </p:cSld>
+  <p:clrMapOvr>
+    <a:masterClrMapping/>
+  </p:clrMapOvr>
+</p:sld>
+</file>
+
+<file path=ppt/slides/slide12.xml><?xml version="1.0" encoding="utf-8"?>
+<p:sld xmlns:a="http://schemas.openxmlformats.org/drawingml/2006/main" xmlns:r="http://schemas.openxmlformats.org/officeDocument/2006/relationships" xmlns:p="http://schemas.openxmlformats.org/presentationml/2006/main">
+  <p:cSld>
+    <p:spTree>
+      <p:nvGrpSpPr>
+        <p:cNvPr id="1" name=""/>
+        <p:cNvGrpSpPr/>
+        <p:nvPr/>
+      </p:nvGrpSpPr>
+      <p:grpSpPr>
+        <a:xfrm>
+          <a:off x="0" y="0"/>
+          <a:ext cx="0" cy="0"/>
+          <a:chOff x="0" y="0"/>
+          <a:chExt cx="0" cy="0"/>
+        </a:xfrm>
+      </p:grpSpPr>
+      <p:sp>
+        <p:nvSpPr>
+          <p:cNvPr id="2" name="Text Placeholder 1">
+            <a:extLst>
+              <a:ext uri="{FF2B5EF4-FFF2-40B4-BE49-F238E27FC236}">
+                <a16:creationId xmlns:a16="http://schemas.microsoft.com/office/drawing/2014/main" id="{8B170740-DB3F-076A-A2D2-9555F51D2D32}"/>
+              </a:ext>
+            </a:extLst>
+          </p:cNvPr>
+          <p:cNvSpPr>
+            <a:spLocks noGrp="1"/>
+          </p:cNvSpPr>
+          <p:nvPr>
+            <p:ph type="body" idx="1"/>
+          </p:nvPr>
+        </p:nvSpPr>
+        <p:spPr>
+          <a:xfrm>
+            <a:off x="729450" y="726744"/>
+            <a:ext cx="7688700" cy="1034400"/>
+          </a:xfrm>
+        </p:spPr>
+        <p:txBody>
+          <a:bodyPr/>
+          <a:lstStyle/>
+          <a:p>
+            <a:pPr marL="146050" indent="0">
+              <a:buNone/>
+            </a:pPr>
+            <a:r>
+              <a:rPr kumimoji="0" lang="en-US" sz="2600" b="1" i="0" u="none" strike="noStrike" kern="0" cap="none" spc="0" normalizeH="0" baseline="0" noProof="0" dirty="0">
+                <a:ln>
+                  <a:noFill/>
+                </a:ln>
+                <a:solidFill>
+                  <a:srgbClr val="1A1A1A"/>
+                </a:solidFill>
+                <a:effectLst/>
+                <a:uLnTx/>
+                <a:uFillTx/>
+                <a:latin typeface="Raleway"/>
+                <a:sym typeface="Raleway"/>
+              </a:rPr>
               <a:t>Objective 1</a:t>
             </a:r>
           </a:p>
@@ -11801,7 +12550,7 @@
 </p:sld>
 </file>
 
-<file path=ppt/slides/slide11.xml><?xml version="1.0" encoding="utf-8"?>
+<file path=ppt/slides/slide13.xml><?xml version="1.0" encoding="utf-8"?>
 <p:sld xmlns:a="http://schemas.openxmlformats.org/drawingml/2006/main" xmlns:r="http://schemas.openxmlformats.org/officeDocument/2006/relationships" xmlns:p="http://schemas.openxmlformats.org/presentationml/2006/main">
   <p:cSld>
     <p:spTree>
@@ -12578,7 +13327,7 @@
 </p:sld>
 </file>
 
-<file path=ppt/slides/slide12.xml><?xml version="1.0" encoding="utf-8"?>
+<file path=ppt/slides/slide14.xml><?xml version="1.0" encoding="utf-8"?>
 <p:sld xmlns:a="http://schemas.openxmlformats.org/drawingml/2006/main" xmlns:r="http://schemas.openxmlformats.org/officeDocument/2006/relationships" xmlns:p="http://schemas.openxmlformats.org/presentationml/2006/main">
   <p:cSld>
     <p:spTree>
@@ -13027,7 +13776,7 @@
 </p:sld>
 </file>
 
-<file path=ppt/slides/slide13.xml><?xml version="1.0" encoding="utf-8"?>
+<file path=ppt/slides/slide15.xml><?xml version="1.0" encoding="utf-8"?>
 <p:sld xmlns:a="http://schemas.openxmlformats.org/drawingml/2006/main" xmlns:r="http://schemas.openxmlformats.org/officeDocument/2006/relationships" xmlns:p="http://schemas.openxmlformats.org/presentationml/2006/main">
   <p:cSld>
     <p:spTree>
@@ -13524,7 +14273,7 @@
 </p:sld>
 </file>
 
-<file path=ppt/slides/slide14.xml><?xml version="1.0" encoding="utf-8"?>
+<file path=ppt/slides/slide16.xml><?xml version="1.0" encoding="utf-8"?>
 <p:sld xmlns:a="http://schemas.openxmlformats.org/drawingml/2006/main" xmlns:r="http://schemas.openxmlformats.org/officeDocument/2006/relationships" xmlns:p="http://schemas.openxmlformats.org/presentationml/2006/main">
   <p:cSld>
     <p:spTree>
@@ -13582,7 +14331,7 @@
 </p:sld>
 </file>
 
-<file path=ppt/slides/slide15.xml><?xml version="1.0" encoding="utf-8"?>
+<file path=ppt/slides/slide17.xml><?xml version="1.0" encoding="utf-8"?>
 <p:sld xmlns:a="http://schemas.openxmlformats.org/drawingml/2006/main" xmlns:r="http://schemas.openxmlformats.org/officeDocument/2006/relationships" xmlns:p="http://schemas.openxmlformats.org/presentationml/2006/main">
   <p:cSld>
     <p:spTree>
@@ -16393,10 +17142,10 @@
       </p:grpSpPr>
       <p:sp>
         <p:nvSpPr>
-          <p:cNvPr id="2" name="Title 1">
+          <p:cNvPr id="2" name="Text Placeholder 1">
             <a:extLst>
               <a:ext uri="{FF2B5EF4-FFF2-40B4-BE49-F238E27FC236}">
-                <a16:creationId xmlns:a16="http://schemas.microsoft.com/office/drawing/2014/main" id="{D1544AB8-4CAC-56EE-6EF0-25499C370501}"/>
+                <a16:creationId xmlns:a16="http://schemas.microsoft.com/office/drawing/2014/main" id="{8B170740-DB3F-076A-A2D2-9555F51D2D32}"/>
               </a:ext>
             </a:extLst>
           </p:cNvPr>
@@ -16404,25 +17153,400 @@
             <a:spLocks noGrp="1"/>
           </p:cNvSpPr>
           <p:nvPr>
-            <p:ph type="ctrTitle"/>
+            <p:ph type="body" idx="1"/>
           </p:nvPr>
         </p:nvSpPr>
-        <p:spPr/>
+        <p:spPr>
+          <a:xfrm>
+            <a:off x="729450" y="726744"/>
+            <a:ext cx="7688700" cy="1034400"/>
+          </a:xfrm>
+        </p:spPr>
         <p:txBody>
           <a:bodyPr/>
           <a:lstStyle/>
           <a:p>
+            <a:pPr marL="146050" indent="0">
+              <a:buNone/>
+            </a:pPr>
             <a:r>
-              <a:rPr lang="en-US" dirty="0"/>
-              <a:t>Objective 1</a:t>
+              <a:rPr kumimoji="0" lang="en-US" sz="2600" b="1" i="0" u="none" strike="noStrike" kern="0" cap="none" spc="0" normalizeH="0" baseline="0" noProof="0" dirty="0">
+                <a:ln>
+                  <a:noFill/>
+                </a:ln>
+                <a:solidFill>
+                  <a:srgbClr val="1A1A1A"/>
+                </a:solidFill>
+                <a:effectLst/>
+                <a:uLnTx/>
+                <a:uFillTx/>
+                <a:latin typeface="Raleway"/>
+                <a:sym typeface="Raleway"/>
+              </a:rPr>
+              <a:t>Exploratory Data Analysis</a:t>
+            </a:r>
+          </a:p>
+          <a:p>
+            <a:pPr marL="146050" indent="0">
+              <a:buNone/>
+            </a:pPr>
+            <a:r>
+              <a:rPr lang="en-US" dirty="0">
+                <a:solidFill>
+                  <a:schemeClr val="bg1">
+                    <a:lumMod val="65000"/>
+                  </a:schemeClr>
+                </a:solidFill>
+              </a:rPr>
+              <a:t>Relationship between Previous Outcome and Y</a:t>
             </a:r>
           </a:p>
         </p:txBody>
       </p:sp>
+      <p:sp>
+        <p:nvSpPr>
+          <p:cNvPr id="8" name="Text Placeholder 2">
+            <a:extLst>
+              <a:ext uri="{FF2B5EF4-FFF2-40B4-BE49-F238E27FC236}">
+                <a16:creationId xmlns:a16="http://schemas.microsoft.com/office/drawing/2014/main" id="{3B13F08B-AEE4-4C95-21B6-8DF753ECA5AD}"/>
+              </a:ext>
+            </a:extLst>
+          </p:cNvPr>
+          <p:cNvSpPr txBox="1">
+            <a:spLocks/>
+          </p:cNvSpPr>
+          <p:nvPr/>
+        </p:nvSpPr>
+        <p:spPr>
+          <a:xfrm>
+            <a:off x="439814" y="1974829"/>
+            <a:ext cx="3367978" cy="332143"/>
+          </a:xfrm>
+          <a:prstGeom prst="rect">
+            <a:avLst/>
+          </a:prstGeom>
+          <a:noFill/>
+          <a:ln>
+            <a:noFill/>
+          </a:ln>
+        </p:spPr>
+        <p:txBody>
+          <a:bodyPr spcFirstLastPara="1" wrap="square" lIns="91425" tIns="91425" rIns="91425" bIns="91425" anchor="t" anchorCtr="0">
+            <a:noAutofit/>
+          </a:bodyPr>
+          <a:lstStyle>
+            <a:defPPr marR="0" lvl="0" algn="l" rtl="0">
+              <a:lnSpc>
+                <a:spcPct val="100000"/>
+              </a:lnSpc>
+              <a:spcBef>
+                <a:spcPts val="0"/>
+              </a:spcBef>
+              <a:spcAft>
+                <a:spcPts val="0"/>
+              </a:spcAft>
+            </a:defPPr>
+            <a:lvl1pPr marL="457200" marR="0" lvl="0" indent="-311150" algn="l" rtl="0">
+              <a:lnSpc>
+                <a:spcPct val="115000"/>
+              </a:lnSpc>
+              <a:spcBef>
+                <a:spcPts val="0"/>
+              </a:spcBef>
+              <a:spcAft>
+                <a:spcPts val="0"/>
+              </a:spcAft>
+              <a:buClr>
+                <a:schemeClr val="accent1"/>
+              </a:buClr>
+              <a:buSzPts val="1300"/>
+              <a:buFont typeface="Lato"/>
+              <a:buChar char="●"/>
+              <a:defRPr sz="1300" b="0" i="0" u="none" strike="noStrike" cap="none">
+                <a:solidFill>
+                  <a:schemeClr val="accent1"/>
+                </a:solidFill>
+                <a:latin typeface="Lato"/>
+                <a:ea typeface="Lato"/>
+                <a:cs typeface="Lato"/>
+                <a:sym typeface="Lato"/>
+              </a:defRPr>
+            </a:lvl1pPr>
+            <a:lvl2pPr marL="914400" marR="0" lvl="1" indent="-298450" algn="l" rtl="0">
+              <a:lnSpc>
+                <a:spcPct val="115000"/>
+              </a:lnSpc>
+              <a:spcBef>
+                <a:spcPts val="1600"/>
+              </a:spcBef>
+              <a:spcAft>
+                <a:spcPts val="0"/>
+              </a:spcAft>
+              <a:buClr>
+                <a:schemeClr val="accent1"/>
+              </a:buClr>
+              <a:buSzPts val="1100"/>
+              <a:buFont typeface="Lato"/>
+              <a:buChar char="○"/>
+              <a:defRPr sz="1100" b="0" i="0" u="none" strike="noStrike" cap="none">
+                <a:solidFill>
+                  <a:schemeClr val="accent1"/>
+                </a:solidFill>
+                <a:latin typeface="Lato"/>
+                <a:ea typeface="Lato"/>
+                <a:cs typeface="Lato"/>
+                <a:sym typeface="Lato"/>
+              </a:defRPr>
+            </a:lvl2pPr>
+            <a:lvl3pPr marL="1371600" marR="0" lvl="2" indent="-298450" algn="l" rtl="0">
+              <a:lnSpc>
+                <a:spcPct val="115000"/>
+              </a:lnSpc>
+              <a:spcBef>
+                <a:spcPts val="1600"/>
+              </a:spcBef>
+              <a:spcAft>
+                <a:spcPts val="0"/>
+              </a:spcAft>
+              <a:buClr>
+                <a:schemeClr val="accent1"/>
+              </a:buClr>
+              <a:buSzPts val="1100"/>
+              <a:buFont typeface="Lato"/>
+              <a:buChar char="■"/>
+              <a:defRPr sz="1100" b="0" i="0" u="none" strike="noStrike" cap="none">
+                <a:solidFill>
+                  <a:schemeClr val="accent1"/>
+                </a:solidFill>
+                <a:latin typeface="Lato"/>
+                <a:ea typeface="Lato"/>
+                <a:cs typeface="Lato"/>
+                <a:sym typeface="Lato"/>
+              </a:defRPr>
+            </a:lvl3pPr>
+            <a:lvl4pPr marL="1828800" marR="0" lvl="3" indent="-298450" algn="l" rtl="0">
+              <a:lnSpc>
+                <a:spcPct val="115000"/>
+              </a:lnSpc>
+              <a:spcBef>
+                <a:spcPts val="1600"/>
+              </a:spcBef>
+              <a:spcAft>
+                <a:spcPts val="0"/>
+              </a:spcAft>
+              <a:buClr>
+                <a:schemeClr val="accent1"/>
+              </a:buClr>
+              <a:buSzPts val="1100"/>
+              <a:buFont typeface="Lato"/>
+              <a:buChar char="●"/>
+              <a:defRPr sz="1100" b="0" i="0" u="none" strike="noStrike" cap="none">
+                <a:solidFill>
+                  <a:schemeClr val="accent1"/>
+                </a:solidFill>
+                <a:latin typeface="Lato"/>
+                <a:ea typeface="Lato"/>
+                <a:cs typeface="Lato"/>
+                <a:sym typeface="Lato"/>
+              </a:defRPr>
+            </a:lvl4pPr>
+            <a:lvl5pPr marL="2286000" marR="0" lvl="4" indent="-298450" algn="l" rtl="0">
+              <a:lnSpc>
+                <a:spcPct val="115000"/>
+              </a:lnSpc>
+              <a:spcBef>
+                <a:spcPts val="1600"/>
+              </a:spcBef>
+              <a:spcAft>
+                <a:spcPts val="0"/>
+              </a:spcAft>
+              <a:buClr>
+                <a:schemeClr val="accent1"/>
+              </a:buClr>
+              <a:buSzPts val="1100"/>
+              <a:buFont typeface="Lato"/>
+              <a:buChar char="○"/>
+              <a:defRPr sz="1100" b="0" i="0" u="none" strike="noStrike" cap="none">
+                <a:solidFill>
+                  <a:schemeClr val="accent1"/>
+                </a:solidFill>
+                <a:latin typeface="Lato"/>
+                <a:ea typeface="Lato"/>
+                <a:cs typeface="Lato"/>
+                <a:sym typeface="Lato"/>
+              </a:defRPr>
+            </a:lvl5pPr>
+            <a:lvl6pPr marL="2743200" marR="0" lvl="5" indent="-298450" algn="l" rtl="0">
+              <a:lnSpc>
+                <a:spcPct val="115000"/>
+              </a:lnSpc>
+              <a:spcBef>
+                <a:spcPts val="1600"/>
+              </a:spcBef>
+              <a:spcAft>
+                <a:spcPts val="0"/>
+              </a:spcAft>
+              <a:buClr>
+                <a:schemeClr val="accent1"/>
+              </a:buClr>
+              <a:buSzPts val="1100"/>
+              <a:buFont typeface="Lato"/>
+              <a:buChar char="■"/>
+              <a:defRPr sz="1100" b="0" i="0" u="none" strike="noStrike" cap="none">
+                <a:solidFill>
+                  <a:schemeClr val="accent1"/>
+                </a:solidFill>
+                <a:latin typeface="Lato"/>
+                <a:ea typeface="Lato"/>
+                <a:cs typeface="Lato"/>
+                <a:sym typeface="Lato"/>
+              </a:defRPr>
+            </a:lvl6pPr>
+            <a:lvl7pPr marL="3200400" marR="0" lvl="6" indent="-298450" algn="l" rtl="0">
+              <a:lnSpc>
+                <a:spcPct val="115000"/>
+              </a:lnSpc>
+              <a:spcBef>
+                <a:spcPts val="1600"/>
+              </a:spcBef>
+              <a:spcAft>
+                <a:spcPts val="0"/>
+              </a:spcAft>
+              <a:buClr>
+                <a:schemeClr val="accent1"/>
+              </a:buClr>
+              <a:buSzPts val="1100"/>
+              <a:buFont typeface="Lato"/>
+              <a:buChar char="●"/>
+              <a:defRPr sz="1100" b="0" i="0" u="none" strike="noStrike" cap="none">
+                <a:solidFill>
+                  <a:schemeClr val="accent1"/>
+                </a:solidFill>
+                <a:latin typeface="Lato"/>
+                <a:ea typeface="Lato"/>
+                <a:cs typeface="Lato"/>
+                <a:sym typeface="Lato"/>
+              </a:defRPr>
+            </a:lvl7pPr>
+            <a:lvl8pPr marL="3657600" marR="0" lvl="7" indent="-298450" algn="l" rtl="0">
+              <a:lnSpc>
+                <a:spcPct val="115000"/>
+              </a:lnSpc>
+              <a:spcBef>
+                <a:spcPts val="1600"/>
+              </a:spcBef>
+              <a:spcAft>
+                <a:spcPts val="0"/>
+              </a:spcAft>
+              <a:buClr>
+                <a:schemeClr val="accent1"/>
+              </a:buClr>
+              <a:buSzPts val="1100"/>
+              <a:buFont typeface="Lato"/>
+              <a:buChar char="○"/>
+              <a:defRPr sz="1100" b="0" i="0" u="none" strike="noStrike" cap="none">
+                <a:solidFill>
+                  <a:schemeClr val="accent1"/>
+                </a:solidFill>
+                <a:latin typeface="Lato"/>
+                <a:ea typeface="Lato"/>
+                <a:cs typeface="Lato"/>
+                <a:sym typeface="Lato"/>
+              </a:defRPr>
+            </a:lvl8pPr>
+            <a:lvl9pPr marL="4114800" marR="0" lvl="8" indent="-298450" algn="l" rtl="0">
+              <a:lnSpc>
+                <a:spcPct val="115000"/>
+              </a:lnSpc>
+              <a:spcBef>
+                <a:spcPts val="1600"/>
+              </a:spcBef>
+              <a:spcAft>
+                <a:spcPts val="1600"/>
+              </a:spcAft>
+              <a:buClr>
+                <a:schemeClr val="accent1"/>
+              </a:buClr>
+              <a:buSzPts val="1100"/>
+              <a:buFont typeface="Lato"/>
+              <a:buChar char="■"/>
+              <a:defRPr sz="1100" b="0" i="0" u="none" strike="noStrike" cap="none">
+                <a:solidFill>
+                  <a:schemeClr val="accent1"/>
+                </a:solidFill>
+                <a:latin typeface="Lato"/>
+                <a:ea typeface="Lato"/>
+                <a:cs typeface="Lato"/>
+                <a:sym typeface="Lato"/>
+              </a:defRPr>
+            </a:lvl9pPr>
+          </a:lstStyle>
+          <a:p>
+            <a:pPr marL="146050" indent="0">
+              <a:buNone/>
+            </a:pPr>
+            <a:r>
+              <a:rPr lang="en-US" dirty="0"/>
+              <a:t>The “success” category in Previous outcome is significantly more likely to have another success </a:t>
+            </a:r>
+          </a:p>
+          <a:p>
+            <a:pPr marL="146050" indent="0">
+              <a:buNone/>
+            </a:pPr>
+            <a:endParaRPr lang="en-US" dirty="0"/>
+          </a:p>
+          <a:p>
+            <a:r>
+              <a:rPr lang="en-US" dirty="0"/>
+              <a:t>Around 65% are likely to have another success </a:t>
+            </a:r>
+          </a:p>
+          <a:p>
+            <a:r>
+              <a:rPr lang="en-US" dirty="0"/>
+              <a:t>Compared to the other categories which have less than 25% likely to have a success </a:t>
+            </a:r>
+          </a:p>
+        </p:txBody>
+      </p:sp>
+      <p:pic>
+        <p:nvPicPr>
+          <p:cNvPr id="6" name="Picture 5">
+            <a:extLst>
+              <a:ext uri="{FF2B5EF4-FFF2-40B4-BE49-F238E27FC236}">
+                <a16:creationId xmlns:a16="http://schemas.microsoft.com/office/drawing/2014/main" id="{A69CA1BE-4C1B-E253-6B46-329807C1BD0B}"/>
+              </a:ext>
+            </a:extLst>
+          </p:cNvPr>
+          <p:cNvPicPr>
+            <a:picLocks noChangeAspect="1"/>
+          </p:cNvPicPr>
+          <p:nvPr/>
+        </p:nvPicPr>
+        <p:blipFill>
+          <a:blip r:embed="rId4"/>
+          <a:stretch>
+            <a:fillRect/>
+          </a:stretch>
+        </p:blipFill>
+        <p:spPr>
+          <a:xfrm>
+            <a:off x="4195167" y="1761144"/>
+            <a:ext cx="4948833" cy="3054137"/>
+          </a:xfrm>
+          <a:prstGeom prst="rect">
+            <a:avLst/>
+          </a:prstGeom>
+        </p:spPr>
+      </p:pic>
     </p:spTree>
+    <p:custDataLst>
+      <p:tags r:id="rId1"/>
+    </p:custDataLst>
     <p:extLst>
       <p:ext uri="{BB962C8B-B14F-4D97-AF65-F5344CB8AC3E}">
-        <p14:creationId xmlns:p14="http://schemas.microsoft.com/office/powerpoint/2010/main" val="3764461431"/>
+        <p14:creationId xmlns:p14="http://schemas.microsoft.com/office/powerpoint/2010/main" val="3579624159"/>
       </p:ext>
     </p:extLst>
   </p:cSld>
@@ -16435,6 +17559,12 @@
 <file path=ppt/tags/tag1.xml><?xml version="1.0" encoding="utf-8"?>
 <p:tagLst xmlns:a="http://schemas.openxmlformats.org/drawingml/2006/main" xmlns:r="http://schemas.openxmlformats.org/officeDocument/2006/relationships" xmlns:p="http://schemas.openxmlformats.org/presentationml/2006/main">
   <p:tag name="TIMING" val="|4.4|8"/>
+</p:tagLst>
+</file>
+
+<file path=ppt/tags/tag10.xml><?xml version="1.0" encoding="utf-8"?>
+<p:tagLst xmlns:a="http://schemas.openxmlformats.org/drawingml/2006/main" xmlns:r="http://schemas.openxmlformats.org/officeDocument/2006/relationships" xmlns:p="http://schemas.openxmlformats.org/presentationml/2006/main">
+  <p:tag name="TIMING" val="|12.7|1.8|1|1.2|1.6|1.1|1.4|1.3|1.5|1.6|21.8"/>
 </p:tagLst>
 </file>
 
@@ -16458,13 +17588,13 @@
 
 <file path=ppt/tags/tag5.xml><?xml version="1.0" encoding="utf-8"?>
 <p:tagLst xmlns:a="http://schemas.openxmlformats.org/drawingml/2006/main" xmlns:r="http://schemas.openxmlformats.org/officeDocument/2006/relationships" xmlns:p="http://schemas.openxmlformats.org/presentationml/2006/main">
-  <p:tag name="TIMING" val="|12.7|1.8|1|1.2|1.6|1.1|1.4|1.3|1.5|1.6|21.8"/>
+  <p:tag name="TIMING" val="|3.2|4.7|2.3"/>
 </p:tagLst>
 </file>
 
 <file path=ppt/tags/tag6.xml><?xml version="1.0" encoding="utf-8"?>
 <p:tagLst xmlns:a="http://schemas.openxmlformats.org/drawingml/2006/main" xmlns:r="http://schemas.openxmlformats.org/officeDocument/2006/relationships" xmlns:p="http://schemas.openxmlformats.org/presentationml/2006/main">
-  <p:tag name="TIMING" val="|12.7|1.8|1|1.2|1.6|1.1|1.4|1.3|1.5|1.6|21.8"/>
+  <p:tag name="TIMING" val="|3.2|4.7|2.3"/>
 </p:tagLst>
 </file>
 
@@ -16475,6 +17605,12 @@
 </file>
 
 <file path=ppt/tags/tag8.xml><?xml version="1.0" encoding="utf-8"?>
+<p:tagLst xmlns:a="http://schemas.openxmlformats.org/drawingml/2006/main" xmlns:r="http://schemas.openxmlformats.org/officeDocument/2006/relationships" xmlns:p="http://schemas.openxmlformats.org/presentationml/2006/main">
+  <p:tag name="TIMING" val="|12.7|1.8|1|1.2|1.6|1.1|1.4|1.3|1.5|1.6|21.8"/>
+</p:tagLst>
+</file>
+
+<file path=ppt/tags/tag9.xml><?xml version="1.0" encoding="utf-8"?>
 <p:tagLst xmlns:a="http://schemas.openxmlformats.org/drawingml/2006/main" xmlns:r="http://schemas.openxmlformats.org/officeDocument/2006/relationships" xmlns:p="http://schemas.openxmlformats.org/presentationml/2006/main">
   <p:tag name="TIMING" val="|12.7|1.8|1|1.2|1.6|1.1|1.4|1.3|1.5|1.6|21.8"/>
 </p:tagLst>

</xml_diff>

<commit_message>
Update EDA on ppt
</commit_message>
<xml_diff>
--- a/Project2_Chang_Craus_Yule.pptx
+++ b/Project2_Chang_Craus_Yule.pptx
@@ -5,7 +5,7 @@
     <p:sldMasterId id="2147483664" r:id="rId1"/>
   </p:sldMasterIdLst>
   <p:notesMasterIdLst>
-    <p:notesMasterId r:id="rId19"/>
+    <p:notesMasterId r:id="rId20"/>
   </p:notesMasterIdLst>
   <p:sldIdLst>
     <p:sldId id="256" r:id="rId2"/>
@@ -18,30 +18,31 @@
     <p:sldId id="302" r:id="rId9"/>
     <p:sldId id="306" r:id="rId10"/>
     <p:sldId id="308" r:id="rId11"/>
-    <p:sldId id="293" r:id="rId12"/>
-    <p:sldId id="294" r:id="rId13"/>
-    <p:sldId id="303" r:id="rId14"/>
-    <p:sldId id="304" r:id="rId15"/>
-    <p:sldId id="305" r:id="rId16"/>
-    <p:sldId id="300" r:id="rId17"/>
-    <p:sldId id="275" r:id="rId18"/>
+    <p:sldId id="309" r:id="rId12"/>
+    <p:sldId id="293" r:id="rId13"/>
+    <p:sldId id="294" r:id="rId14"/>
+    <p:sldId id="303" r:id="rId15"/>
+    <p:sldId id="304" r:id="rId16"/>
+    <p:sldId id="305" r:id="rId17"/>
+    <p:sldId id="300" r:id="rId18"/>
+    <p:sldId id="275" r:id="rId19"/>
   </p:sldIdLst>
   <p:sldSz cx="9144000" cy="5143500" type="screen16x9"/>
   <p:notesSz cx="6858000" cy="9144000"/>
   <p:embeddedFontLst>
     <p:embeddedFont>
       <p:font typeface="Lato" panose="020F0502020204030203" pitchFamily="34" charset="0"/>
-      <p:regular r:id="rId20"/>
-      <p:bold r:id="rId21"/>
-      <p:italic r:id="rId22"/>
-      <p:boldItalic r:id="rId23"/>
+      <p:regular r:id="rId21"/>
+      <p:bold r:id="rId22"/>
+      <p:italic r:id="rId23"/>
+      <p:boldItalic r:id="rId24"/>
     </p:embeddedFont>
     <p:embeddedFont>
       <p:font typeface="Raleway" pitchFamily="2" charset="0"/>
-      <p:regular r:id="rId24"/>
-      <p:bold r:id="rId25"/>
-      <p:italic r:id="rId26"/>
-      <p:boldItalic r:id="rId27"/>
+      <p:regular r:id="rId25"/>
+      <p:bold r:id="rId26"/>
+      <p:italic r:id="rId27"/>
+      <p:boldItalic r:id="rId28"/>
     </p:embeddedFont>
   </p:embeddedFontLst>
   <p:defaultTextStyle>
@@ -295,7 +296,7 @@
 <file path=ppt/revisionInfo.xml><?xml version="1.0" encoding="utf-8"?>
 <p1510:revInfo xmlns:a="http://schemas.openxmlformats.org/drawingml/2006/main" xmlns:r="http://schemas.openxmlformats.org/officeDocument/2006/relationships" xmlns:p1510="http://schemas.microsoft.com/office/powerpoint/2015/10/main">
   <p1510:revLst>
-    <p1510:client id="{32165585-CB35-4C33-B919-9B0DD83E6E32}" v="7" dt="2023-04-10T20:49:30.756"/>
+    <p1510:client id="{32165585-CB35-4C33-B919-9B0DD83E6E32}" v="17" dt="2023-04-10T21:21:25.822"/>
   </p1510:revLst>
 </p1510:revInfo>
 </file>
@@ -305,7 +306,7 @@
   <pc:docChgLst>
     <pc:chgData name="Carolina Craus" userId="bae62b9d695bbdd6" providerId="LiveId" clId="{32165585-CB35-4C33-B919-9B0DD83E6E32}"/>
     <pc:docChg chg="custSel addSld delSld modSld sldOrd">
-      <pc:chgData name="Carolina Craus" userId="bae62b9d695bbdd6" providerId="LiveId" clId="{32165585-CB35-4C33-B919-9B0DD83E6E32}" dt="2023-04-10T20:54:32.530" v="724" actId="20577"/>
+      <pc:chgData name="Carolina Craus" userId="bae62b9d695bbdd6" providerId="LiveId" clId="{32165585-CB35-4C33-B919-9B0DD83E6E32}" dt="2023-04-10T21:22:36.190" v="875" actId="1076"/>
       <pc:docMkLst>
         <pc:docMk/>
       </pc:docMkLst>
@@ -391,6 +392,85 @@
             <pc:docMk/>
             <pc:sldMk cId="3004351000" sldId="308"/>
             <ac:picMk id="6" creationId="{92F350EB-A179-C072-4BB8-1935AE3A0486}"/>
+          </ac:picMkLst>
+        </pc:picChg>
+      </pc:sldChg>
+      <pc:sldChg chg="addSp delSp modSp add mod ord">
+        <pc:chgData name="Carolina Craus" userId="bae62b9d695bbdd6" providerId="LiveId" clId="{32165585-CB35-4C33-B919-9B0DD83E6E32}" dt="2023-04-10T21:22:36.190" v="875" actId="1076"/>
+        <pc:sldMkLst>
+          <pc:docMk/>
+          <pc:sldMk cId="2424990968" sldId="309"/>
+        </pc:sldMkLst>
+        <pc:spChg chg="mod">
+          <ac:chgData name="Carolina Craus" userId="bae62b9d695bbdd6" providerId="LiveId" clId="{32165585-CB35-4C33-B919-9B0DD83E6E32}" dt="2023-04-10T21:20:13.037" v="773" actId="20577"/>
+          <ac:spMkLst>
+            <pc:docMk/>
+            <pc:sldMk cId="2424990968" sldId="309"/>
+            <ac:spMk id="2" creationId="{8B170740-DB3F-076A-A2D2-9555F51D2D32}"/>
+          </ac:spMkLst>
+        </pc:spChg>
+        <pc:spChg chg="add del">
+          <ac:chgData name="Carolina Craus" userId="bae62b9d695bbdd6" providerId="LiveId" clId="{32165585-CB35-4C33-B919-9B0DD83E6E32}" dt="2023-04-10T21:20:05.960" v="766"/>
+          <ac:spMkLst>
+            <pc:docMk/>
+            <pc:sldMk cId="2424990968" sldId="309"/>
+            <ac:spMk id="3" creationId="{CB463F1C-6D75-7AF3-BC7F-EC47D9EC6780}"/>
+          </ac:spMkLst>
+        </pc:spChg>
+        <pc:spChg chg="add del">
+          <ac:chgData name="Carolina Craus" userId="bae62b9d695bbdd6" providerId="LiveId" clId="{32165585-CB35-4C33-B919-9B0DD83E6E32}" dt="2023-04-10T21:20:25.706" v="777"/>
+          <ac:spMkLst>
+            <pc:docMk/>
+            <pc:sldMk cId="2424990968" sldId="309"/>
+            <ac:spMk id="5" creationId="{1CA82C2F-4389-18F6-F24A-D5E2F991FF66}"/>
+          </ac:spMkLst>
+        </pc:spChg>
+        <pc:spChg chg="add del">
+          <ac:chgData name="Carolina Craus" userId="bae62b9d695bbdd6" providerId="LiveId" clId="{32165585-CB35-4C33-B919-9B0DD83E6E32}" dt="2023-04-10T21:20:44.219" v="782"/>
+          <ac:spMkLst>
+            <pc:docMk/>
+            <pc:sldMk cId="2424990968" sldId="309"/>
+            <ac:spMk id="7" creationId="{D7F791C7-1224-D5F8-0D7A-3C4A5B1AEC65}"/>
+          </ac:spMkLst>
+        </pc:spChg>
+        <pc:spChg chg="mod">
+          <ac:chgData name="Carolina Craus" userId="bae62b9d695bbdd6" providerId="LiveId" clId="{32165585-CB35-4C33-B919-9B0DD83E6E32}" dt="2023-04-10T21:19:55.932" v="764" actId="14100"/>
+          <ac:spMkLst>
+            <pc:docMk/>
+            <pc:sldMk cId="2424990968" sldId="309"/>
+            <ac:spMk id="8" creationId="{3B13F08B-AEE4-4C95-21B6-8DF753ECA5AD}"/>
+          </ac:spMkLst>
+        </pc:spChg>
+        <pc:spChg chg="add mod">
+          <ac:chgData name="Carolina Craus" userId="bae62b9d695bbdd6" providerId="LiveId" clId="{32165585-CB35-4C33-B919-9B0DD83E6E32}" dt="2023-04-10T21:22:36.190" v="875" actId="1076"/>
+          <ac:spMkLst>
+            <pc:docMk/>
+            <pc:sldMk cId="2424990968" sldId="309"/>
+            <ac:spMk id="10" creationId="{A12E1ABB-8023-4ADC-BEFB-5F1E561C4FE5}"/>
+          </ac:spMkLst>
+        </pc:spChg>
+        <pc:picChg chg="add del mod">
+          <ac:chgData name="Carolina Craus" userId="bae62b9d695bbdd6" providerId="LiveId" clId="{32165585-CB35-4C33-B919-9B0DD83E6E32}" dt="2023-04-10T21:20:16.822" v="775" actId="478"/>
+          <ac:picMkLst>
+            <pc:docMk/>
+            <pc:sldMk cId="2424990968" sldId="309"/>
+            <ac:picMk id="4" creationId="{45D9472E-4F57-96A9-D25A-5DD7CE68DF4D}"/>
+          </ac:picMkLst>
+        </pc:picChg>
+        <pc:picChg chg="add mod">
+          <ac:chgData name="Carolina Craus" userId="bae62b9d695bbdd6" providerId="LiveId" clId="{32165585-CB35-4C33-B919-9B0DD83E6E32}" dt="2023-04-10T21:20:52.090" v="786" actId="1076"/>
+          <ac:picMkLst>
+            <pc:docMk/>
+            <pc:sldMk cId="2424990968" sldId="309"/>
+            <ac:picMk id="6" creationId="{73580CB5-D47D-F7CE-5EC3-BF50DC366B5E}"/>
+          </ac:picMkLst>
+        </pc:picChg>
+        <pc:picChg chg="add mod">
+          <ac:chgData name="Carolina Craus" userId="bae62b9d695bbdd6" providerId="LiveId" clId="{32165585-CB35-4C33-B919-9B0DD83E6E32}" dt="2023-04-10T21:20:56.165" v="787" actId="1076"/>
+          <ac:picMkLst>
+            <pc:docMk/>
+            <pc:sldMk cId="2424990968" sldId="309"/>
+            <ac:picMk id="9" creationId="{AA4E9141-2AC9-294A-243D-B52BCE5A6F0C}"/>
           </ac:picMkLst>
         </pc:picChg>
       </pc:sldChg>
@@ -1072,7 +1152,7 @@
     </p:spTree>
     <p:extLst>
       <p:ext uri="{BB962C8B-B14F-4D97-AF65-F5344CB8AC3E}">
-        <p14:creationId xmlns:p14="http://schemas.microsoft.com/office/powerpoint/2010/main" val="3868119659"/>
+        <p14:creationId xmlns:p14="http://schemas.microsoft.com/office/powerpoint/2010/main" val="12658897"/>
       </p:ext>
     </p:extLst>
   </p:cSld>
@@ -1141,7 +1221,7 @@
     </p:spTree>
     <p:extLst>
       <p:ext uri="{BB962C8B-B14F-4D97-AF65-F5344CB8AC3E}">
-        <p14:creationId xmlns:p14="http://schemas.microsoft.com/office/powerpoint/2010/main" val="579046869"/>
+        <p14:creationId xmlns:p14="http://schemas.microsoft.com/office/powerpoint/2010/main" val="3868119659"/>
       </p:ext>
     </p:extLst>
   </p:cSld>
@@ -1210,7 +1290,7 @@
     </p:spTree>
     <p:extLst>
       <p:ext uri="{BB962C8B-B14F-4D97-AF65-F5344CB8AC3E}">
-        <p14:creationId xmlns:p14="http://schemas.microsoft.com/office/powerpoint/2010/main" val="1994813416"/>
+        <p14:creationId xmlns:p14="http://schemas.microsoft.com/office/powerpoint/2010/main" val="579046869"/>
       </p:ext>
     </p:extLst>
   </p:cSld>
@@ -1279,7 +1359,7 @@
     </p:spTree>
     <p:extLst>
       <p:ext uri="{BB962C8B-B14F-4D97-AF65-F5344CB8AC3E}">
-        <p14:creationId xmlns:p14="http://schemas.microsoft.com/office/powerpoint/2010/main" val="2131577643"/>
+        <p14:creationId xmlns:p14="http://schemas.microsoft.com/office/powerpoint/2010/main" val="1994813416"/>
       </p:ext>
     </p:extLst>
   </p:cSld>
@@ -1348,7 +1428,7 @@
     </p:spTree>
     <p:extLst>
       <p:ext uri="{BB962C8B-B14F-4D97-AF65-F5344CB8AC3E}">
-        <p14:creationId xmlns:p14="http://schemas.microsoft.com/office/powerpoint/2010/main" val="3189567172"/>
+        <p14:creationId xmlns:p14="http://schemas.microsoft.com/office/powerpoint/2010/main" val="2131577643"/>
       </p:ext>
     </p:extLst>
   </p:cSld>
@@ -1417,6 +1497,75 @@
     </p:spTree>
     <p:extLst>
       <p:ext uri="{BB962C8B-B14F-4D97-AF65-F5344CB8AC3E}">
+        <p14:creationId xmlns:p14="http://schemas.microsoft.com/office/powerpoint/2010/main" val="3189567172"/>
+      </p:ext>
+    </p:extLst>
+  </p:cSld>
+  <p:clrMapOvr>
+    <a:masterClrMapping/>
+  </p:clrMapOvr>
+</p:notes>
+</file>
+
+<file path=ppt/notesSlides/notesSlide17.xml><?xml version="1.0" encoding="utf-8"?>
+<p:notes xmlns:a="http://schemas.openxmlformats.org/drawingml/2006/main" xmlns:r="http://schemas.openxmlformats.org/officeDocument/2006/relationships" xmlns:p="http://schemas.openxmlformats.org/presentationml/2006/main">
+  <p:cSld>
+    <p:spTree>
+      <p:nvGrpSpPr>
+        <p:cNvPr id="1" name=""/>
+        <p:cNvGrpSpPr/>
+        <p:nvPr/>
+      </p:nvGrpSpPr>
+      <p:grpSpPr>
+        <a:xfrm>
+          <a:off x="0" y="0"/>
+          <a:ext cx="0" cy="0"/>
+          <a:chOff x="0" y="0"/>
+          <a:chExt cx="0" cy="0"/>
+        </a:xfrm>
+      </p:grpSpPr>
+      <p:sp>
+        <p:nvSpPr>
+          <p:cNvPr id="2" name="Slide Image Placeholder 1"/>
+          <p:cNvSpPr>
+            <a:spLocks noGrp="1" noRot="1" noChangeAspect="1"/>
+          </p:cNvSpPr>
+          <p:nvPr>
+            <p:ph type="sldImg"/>
+          </p:nvPr>
+        </p:nvSpPr>
+        <p:spPr>
+          <a:xfrm>
+            <a:off x="381000" y="685800"/>
+            <a:ext cx="6096000" cy="3429000"/>
+          </a:xfrm>
+        </p:spPr>
+      </p:sp>
+      <p:sp>
+        <p:nvSpPr>
+          <p:cNvPr id="3" name="Notes Placeholder 2"/>
+          <p:cNvSpPr>
+            <a:spLocks noGrp="1"/>
+          </p:cNvSpPr>
+          <p:nvPr>
+            <p:ph type="body" idx="1"/>
+          </p:nvPr>
+        </p:nvSpPr>
+        <p:spPr/>
+        <p:txBody>
+          <a:bodyPr/>
+          <a:lstStyle/>
+          <a:p>
+            <a:pPr marL="139700" indent="0">
+              <a:buNone/>
+            </a:pPr>
+            <a:endParaRPr lang="en-US" dirty="0"/>
+          </a:p>
+        </p:txBody>
+      </p:sp>
+    </p:spTree>
+    <p:extLst>
+      <p:ext uri="{BB962C8B-B14F-4D97-AF65-F5344CB8AC3E}">
         <p14:creationId xmlns:p14="http://schemas.microsoft.com/office/powerpoint/2010/main" val="1238886777"/>
       </p:ext>
     </p:extLst>
@@ -1427,7 +1576,7 @@
 </p:notes>
 </file>
 
-<file path=ppt/notesSlides/notesSlide17.xml><?xml version="1.0" encoding="utf-8"?>
+<file path=ppt/notesSlides/notesSlide18.xml><?xml version="1.0" encoding="utf-8"?>
 <p:notes xmlns:a="http://schemas.openxmlformats.org/drawingml/2006/main" xmlns:r="http://schemas.openxmlformats.org/officeDocument/2006/relationships" xmlns:p="http://schemas.openxmlformats.org/presentationml/2006/main" showMasterSp="0" showMasterPhAnim="0">
   <p:cSld>
     <p:spTree>
@@ -11738,15 +11887,7 @@
           <a:p>
             <a:r>
               <a:rPr lang="en-US" dirty="0"/>
-              <a:t>The rest of the months have </a:t>
-            </a:r>
-            <a:r>
-              <a:rPr lang="en-US"/>
-              <a:t>less than </a:t>
-            </a:r>
-            <a:r>
-              <a:rPr lang="en-US" dirty="0"/>
-              <a:t>25% rate of resubscribing to a term deposit </a:t>
+              <a:t>The rest of the months have less than 25% rate of resubscribing to a term deposit </a:t>
             </a:r>
           </a:p>
           <a:p>
@@ -11819,6 +11960,737 @@
       </p:grpSpPr>
       <p:sp>
         <p:nvSpPr>
+          <p:cNvPr id="2" name="Text Placeholder 1">
+            <a:extLst>
+              <a:ext uri="{FF2B5EF4-FFF2-40B4-BE49-F238E27FC236}">
+                <a16:creationId xmlns:a16="http://schemas.microsoft.com/office/drawing/2014/main" id="{8B170740-DB3F-076A-A2D2-9555F51D2D32}"/>
+              </a:ext>
+            </a:extLst>
+          </p:cNvPr>
+          <p:cNvSpPr>
+            <a:spLocks noGrp="1"/>
+          </p:cNvSpPr>
+          <p:nvPr>
+            <p:ph type="body" idx="1"/>
+          </p:nvPr>
+        </p:nvSpPr>
+        <p:spPr>
+          <a:xfrm>
+            <a:off x="729450" y="726744"/>
+            <a:ext cx="7688700" cy="1034400"/>
+          </a:xfrm>
+        </p:spPr>
+        <p:txBody>
+          <a:bodyPr/>
+          <a:lstStyle/>
+          <a:p>
+            <a:pPr marL="146050" indent="0">
+              <a:buNone/>
+            </a:pPr>
+            <a:r>
+              <a:rPr kumimoji="0" lang="en-US" sz="2600" b="1" i="0" u="none" strike="noStrike" kern="0" cap="none" spc="0" normalizeH="0" baseline="0" noProof="0" dirty="0">
+                <a:ln>
+                  <a:noFill/>
+                </a:ln>
+                <a:solidFill>
+                  <a:srgbClr val="1A1A1A"/>
+                </a:solidFill>
+                <a:effectLst/>
+                <a:uLnTx/>
+                <a:uFillTx/>
+                <a:latin typeface="Raleway"/>
+                <a:sym typeface="Raleway"/>
+              </a:rPr>
+              <a:t>Exploratory Data Analysis</a:t>
+            </a:r>
+          </a:p>
+          <a:p>
+            <a:pPr marL="146050" indent="0">
+              <a:buNone/>
+            </a:pPr>
+            <a:r>
+              <a:rPr lang="en-US" dirty="0">
+                <a:solidFill>
+                  <a:schemeClr val="bg1">
+                    <a:lumMod val="65000"/>
+                  </a:schemeClr>
+                </a:solidFill>
+              </a:rPr>
+              <a:t>Correlation Plot and Heatmap </a:t>
+            </a:r>
+          </a:p>
+        </p:txBody>
+      </p:sp>
+      <p:sp>
+        <p:nvSpPr>
+          <p:cNvPr id="8" name="Text Placeholder 2">
+            <a:extLst>
+              <a:ext uri="{FF2B5EF4-FFF2-40B4-BE49-F238E27FC236}">
+                <a16:creationId xmlns:a16="http://schemas.microsoft.com/office/drawing/2014/main" id="{3B13F08B-AEE4-4C95-21B6-8DF753ECA5AD}"/>
+              </a:ext>
+            </a:extLst>
+          </p:cNvPr>
+          <p:cNvSpPr txBox="1">
+            <a:spLocks/>
+          </p:cNvSpPr>
+          <p:nvPr/>
+        </p:nvSpPr>
+        <p:spPr>
+          <a:xfrm>
+            <a:off x="725850" y="1761143"/>
+            <a:ext cx="515721" cy="1527341"/>
+          </a:xfrm>
+          <a:prstGeom prst="rect">
+            <a:avLst/>
+          </a:prstGeom>
+          <a:noFill/>
+          <a:ln>
+            <a:noFill/>
+          </a:ln>
+        </p:spPr>
+        <p:txBody>
+          <a:bodyPr spcFirstLastPara="1" wrap="square" lIns="91425" tIns="91425" rIns="91425" bIns="91425" anchor="t" anchorCtr="0">
+            <a:noAutofit/>
+          </a:bodyPr>
+          <a:lstStyle>
+            <a:defPPr marR="0" lvl="0" algn="l" rtl="0">
+              <a:lnSpc>
+                <a:spcPct val="100000"/>
+              </a:lnSpc>
+              <a:spcBef>
+                <a:spcPts val="0"/>
+              </a:spcBef>
+              <a:spcAft>
+                <a:spcPts val="0"/>
+              </a:spcAft>
+            </a:defPPr>
+            <a:lvl1pPr marL="457200" marR="0" lvl="0" indent="-311150" algn="l" rtl="0">
+              <a:lnSpc>
+                <a:spcPct val="115000"/>
+              </a:lnSpc>
+              <a:spcBef>
+                <a:spcPts val="0"/>
+              </a:spcBef>
+              <a:spcAft>
+                <a:spcPts val="0"/>
+              </a:spcAft>
+              <a:buClr>
+                <a:schemeClr val="accent1"/>
+              </a:buClr>
+              <a:buSzPts val="1300"/>
+              <a:buFont typeface="Lato"/>
+              <a:buChar char="●"/>
+              <a:defRPr sz="1300" b="0" i="0" u="none" strike="noStrike" cap="none">
+                <a:solidFill>
+                  <a:schemeClr val="accent1"/>
+                </a:solidFill>
+                <a:latin typeface="Lato"/>
+                <a:ea typeface="Lato"/>
+                <a:cs typeface="Lato"/>
+                <a:sym typeface="Lato"/>
+              </a:defRPr>
+            </a:lvl1pPr>
+            <a:lvl2pPr marL="914400" marR="0" lvl="1" indent="-298450" algn="l" rtl="0">
+              <a:lnSpc>
+                <a:spcPct val="115000"/>
+              </a:lnSpc>
+              <a:spcBef>
+                <a:spcPts val="1600"/>
+              </a:spcBef>
+              <a:spcAft>
+                <a:spcPts val="0"/>
+              </a:spcAft>
+              <a:buClr>
+                <a:schemeClr val="accent1"/>
+              </a:buClr>
+              <a:buSzPts val="1100"/>
+              <a:buFont typeface="Lato"/>
+              <a:buChar char="○"/>
+              <a:defRPr sz="1100" b="0" i="0" u="none" strike="noStrike" cap="none">
+                <a:solidFill>
+                  <a:schemeClr val="accent1"/>
+                </a:solidFill>
+                <a:latin typeface="Lato"/>
+                <a:ea typeface="Lato"/>
+                <a:cs typeface="Lato"/>
+                <a:sym typeface="Lato"/>
+              </a:defRPr>
+            </a:lvl2pPr>
+            <a:lvl3pPr marL="1371600" marR="0" lvl="2" indent="-298450" algn="l" rtl="0">
+              <a:lnSpc>
+                <a:spcPct val="115000"/>
+              </a:lnSpc>
+              <a:spcBef>
+                <a:spcPts val="1600"/>
+              </a:spcBef>
+              <a:spcAft>
+                <a:spcPts val="0"/>
+              </a:spcAft>
+              <a:buClr>
+                <a:schemeClr val="accent1"/>
+              </a:buClr>
+              <a:buSzPts val="1100"/>
+              <a:buFont typeface="Lato"/>
+              <a:buChar char="■"/>
+              <a:defRPr sz="1100" b="0" i="0" u="none" strike="noStrike" cap="none">
+                <a:solidFill>
+                  <a:schemeClr val="accent1"/>
+                </a:solidFill>
+                <a:latin typeface="Lato"/>
+                <a:ea typeface="Lato"/>
+                <a:cs typeface="Lato"/>
+                <a:sym typeface="Lato"/>
+              </a:defRPr>
+            </a:lvl3pPr>
+            <a:lvl4pPr marL="1828800" marR="0" lvl="3" indent="-298450" algn="l" rtl="0">
+              <a:lnSpc>
+                <a:spcPct val="115000"/>
+              </a:lnSpc>
+              <a:spcBef>
+                <a:spcPts val="1600"/>
+              </a:spcBef>
+              <a:spcAft>
+                <a:spcPts val="0"/>
+              </a:spcAft>
+              <a:buClr>
+                <a:schemeClr val="accent1"/>
+              </a:buClr>
+              <a:buSzPts val="1100"/>
+              <a:buFont typeface="Lato"/>
+              <a:buChar char="●"/>
+              <a:defRPr sz="1100" b="0" i="0" u="none" strike="noStrike" cap="none">
+                <a:solidFill>
+                  <a:schemeClr val="accent1"/>
+                </a:solidFill>
+                <a:latin typeface="Lato"/>
+                <a:ea typeface="Lato"/>
+                <a:cs typeface="Lato"/>
+                <a:sym typeface="Lato"/>
+              </a:defRPr>
+            </a:lvl4pPr>
+            <a:lvl5pPr marL="2286000" marR="0" lvl="4" indent="-298450" algn="l" rtl="0">
+              <a:lnSpc>
+                <a:spcPct val="115000"/>
+              </a:lnSpc>
+              <a:spcBef>
+                <a:spcPts val="1600"/>
+              </a:spcBef>
+              <a:spcAft>
+                <a:spcPts val="0"/>
+              </a:spcAft>
+              <a:buClr>
+                <a:schemeClr val="accent1"/>
+              </a:buClr>
+              <a:buSzPts val="1100"/>
+              <a:buFont typeface="Lato"/>
+              <a:buChar char="○"/>
+              <a:defRPr sz="1100" b="0" i="0" u="none" strike="noStrike" cap="none">
+                <a:solidFill>
+                  <a:schemeClr val="accent1"/>
+                </a:solidFill>
+                <a:latin typeface="Lato"/>
+                <a:ea typeface="Lato"/>
+                <a:cs typeface="Lato"/>
+                <a:sym typeface="Lato"/>
+              </a:defRPr>
+            </a:lvl5pPr>
+            <a:lvl6pPr marL="2743200" marR="0" lvl="5" indent="-298450" algn="l" rtl="0">
+              <a:lnSpc>
+                <a:spcPct val="115000"/>
+              </a:lnSpc>
+              <a:spcBef>
+                <a:spcPts val="1600"/>
+              </a:spcBef>
+              <a:spcAft>
+                <a:spcPts val="0"/>
+              </a:spcAft>
+              <a:buClr>
+                <a:schemeClr val="accent1"/>
+              </a:buClr>
+              <a:buSzPts val="1100"/>
+              <a:buFont typeface="Lato"/>
+              <a:buChar char="■"/>
+              <a:defRPr sz="1100" b="0" i="0" u="none" strike="noStrike" cap="none">
+                <a:solidFill>
+                  <a:schemeClr val="accent1"/>
+                </a:solidFill>
+                <a:latin typeface="Lato"/>
+                <a:ea typeface="Lato"/>
+                <a:cs typeface="Lato"/>
+                <a:sym typeface="Lato"/>
+              </a:defRPr>
+            </a:lvl6pPr>
+            <a:lvl7pPr marL="3200400" marR="0" lvl="6" indent="-298450" algn="l" rtl="0">
+              <a:lnSpc>
+                <a:spcPct val="115000"/>
+              </a:lnSpc>
+              <a:spcBef>
+                <a:spcPts val="1600"/>
+              </a:spcBef>
+              <a:spcAft>
+                <a:spcPts val="0"/>
+              </a:spcAft>
+              <a:buClr>
+                <a:schemeClr val="accent1"/>
+              </a:buClr>
+              <a:buSzPts val="1100"/>
+              <a:buFont typeface="Lato"/>
+              <a:buChar char="●"/>
+              <a:defRPr sz="1100" b="0" i="0" u="none" strike="noStrike" cap="none">
+                <a:solidFill>
+                  <a:schemeClr val="accent1"/>
+                </a:solidFill>
+                <a:latin typeface="Lato"/>
+                <a:ea typeface="Lato"/>
+                <a:cs typeface="Lato"/>
+                <a:sym typeface="Lato"/>
+              </a:defRPr>
+            </a:lvl7pPr>
+            <a:lvl8pPr marL="3657600" marR="0" lvl="7" indent="-298450" algn="l" rtl="0">
+              <a:lnSpc>
+                <a:spcPct val="115000"/>
+              </a:lnSpc>
+              <a:spcBef>
+                <a:spcPts val="1600"/>
+              </a:spcBef>
+              <a:spcAft>
+                <a:spcPts val="0"/>
+              </a:spcAft>
+              <a:buClr>
+                <a:schemeClr val="accent1"/>
+              </a:buClr>
+              <a:buSzPts val="1100"/>
+              <a:buFont typeface="Lato"/>
+              <a:buChar char="○"/>
+              <a:defRPr sz="1100" b="0" i="0" u="none" strike="noStrike" cap="none">
+                <a:solidFill>
+                  <a:schemeClr val="accent1"/>
+                </a:solidFill>
+                <a:latin typeface="Lato"/>
+                <a:ea typeface="Lato"/>
+                <a:cs typeface="Lato"/>
+                <a:sym typeface="Lato"/>
+              </a:defRPr>
+            </a:lvl8pPr>
+            <a:lvl9pPr marL="4114800" marR="0" lvl="8" indent="-298450" algn="l" rtl="0">
+              <a:lnSpc>
+                <a:spcPct val="115000"/>
+              </a:lnSpc>
+              <a:spcBef>
+                <a:spcPts val="1600"/>
+              </a:spcBef>
+              <a:spcAft>
+                <a:spcPts val="1600"/>
+              </a:spcAft>
+              <a:buClr>
+                <a:schemeClr val="accent1"/>
+              </a:buClr>
+              <a:buSzPts val="1100"/>
+              <a:buFont typeface="Lato"/>
+              <a:buChar char="■"/>
+              <a:defRPr sz="1100" b="0" i="0" u="none" strike="noStrike" cap="none">
+                <a:solidFill>
+                  <a:schemeClr val="accent1"/>
+                </a:solidFill>
+                <a:latin typeface="Lato"/>
+                <a:ea typeface="Lato"/>
+                <a:cs typeface="Lato"/>
+                <a:sym typeface="Lato"/>
+              </a:defRPr>
+            </a:lvl9pPr>
+          </a:lstStyle>
+          <a:p>
+            <a:pPr marL="146050" indent="0">
+              <a:buNone/>
+            </a:pPr>
+            <a:endParaRPr lang="en-US" dirty="0"/>
+          </a:p>
+        </p:txBody>
+      </p:sp>
+      <p:pic>
+        <p:nvPicPr>
+          <p:cNvPr id="6" name="Picture 5">
+            <a:extLst>
+              <a:ext uri="{FF2B5EF4-FFF2-40B4-BE49-F238E27FC236}">
+                <a16:creationId xmlns:a16="http://schemas.microsoft.com/office/drawing/2014/main" id="{73580CB5-D47D-F7CE-5EC3-BF50DC366B5E}"/>
+              </a:ext>
+            </a:extLst>
+          </p:cNvPr>
+          <p:cNvPicPr>
+            <a:picLocks noChangeAspect="1"/>
+          </p:cNvPicPr>
+          <p:nvPr/>
+        </p:nvPicPr>
+        <p:blipFill>
+          <a:blip r:embed="rId4"/>
+          <a:stretch>
+            <a:fillRect/>
+          </a:stretch>
+        </p:blipFill>
+        <p:spPr>
+          <a:xfrm>
+            <a:off x="0" y="1809368"/>
+            <a:ext cx="4793434" cy="2958234"/>
+          </a:xfrm>
+          <a:prstGeom prst="rect">
+            <a:avLst/>
+          </a:prstGeom>
+        </p:spPr>
+      </p:pic>
+      <p:pic>
+        <p:nvPicPr>
+          <p:cNvPr id="9" name="Picture 8">
+            <a:extLst>
+              <a:ext uri="{FF2B5EF4-FFF2-40B4-BE49-F238E27FC236}">
+                <a16:creationId xmlns:a16="http://schemas.microsoft.com/office/drawing/2014/main" id="{AA4E9141-2AC9-294A-243D-B52BCE5A6F0C}"/>
+              </a:ext>
+            </a:extLst>
+          </p:cNvPr>
+          <p:cNvPicPr>
+            <a:picLocks noChangeAspect="1"/>
+          </p:cNvPicPr>
+          <p:nvPr/>
+        </p:nvPicPr>
+        <p:blipFill>
+          <a:blip r:embed="rId5"/>
+          <a:stretch>
+            <a:fillRect/>
+          </a:stretch>
+        </p:blipFill>
+        <p:spPr>
+          <a:xfrm>
+            <a:off x="4793434" y="1941386"/>
+            <a:ext cx="4365596" cy="2694196"/>
+          </a:xfrm>
+          <a:prstGeom prst="rect">
+            <a:avLst/>
+          </a:prstGeom>
+        </p:spPr>
+      </p:pic>
+      <p:sp>
+        <p:nvSpPr>
+          <p:cNvPr id="10" name="Text Placeholder 2">
+            <a:extLst>
+              <a:ext uri="{FF2B5EF4-FFF2-40B4-BE49-F238E27FC236}">
+                <a16:creationId xmlns:a16="http://schemas.microsoft.com/office/drawing/2014/main" id="{A12E1ABB-8023-4ADC-BEFB-5F1E561C4FE5}"/>
+              </a:ext>
+            </a:extLst>
+          </p:cNvPr>
+          <p:cNvSpPr txBox="1">
+            <a:spLocks/>
+          </p:cNvSpPr>
+          <p:nvPr/>
+        </p:nvSpPr>
+        <p:spPr>
+          <a:xfrm>
+            <a:off x="5548446" y="1177185"/>
+            <a:ext cx="3872391" cy="583958"/>
+          </a:xfrm>
+          <a:prstGeom prst="rect">
+            <a:avLst/>
+          </a:prstGeom>
+          <a:noFill/>
+          <a:ln>
+            <a:noFill/>
+          </a:ln>
+        </p:spPr>
+        <p:txBody>
+          <a:bodyPr spcFirstLastPara="1" wrap="square" lIns="91425" tIns="91425" rIns="91425" bIns="91425" anchor="t" anchorCtr="0">
+            <a:noAutofit/>
+          </a:bodyPr>
+          <a:lstStyle>
+            <a:defPPr marR="0" lvl="0" algn="l" rtl="0">
+              <a:lnSpc>
+                <a:spcPct val="100000"/>
+              </a:lnSpc>
+              <a:spcBef>
+                <a:spcPts val="0"/>
+              </a:spcBef>
+              <a:spcAft>
+                <a:spcPts val="0"/>
+              </a:spcAft>
+            </a:defPPr>
+            <a:lvl1pPr marL="457200" marR="0" lvl="0" indent="-311150" algn="l" rtl="0">
+              <a:lnSpc>
+                <a:spcPct val="115000"/>
+              </a:lnSpc>
+              <a:spcBef>
+                <a:spcPts val="0"/>
+              </a:spcBef>
+              <a:spcAft>
+                <a:spcPts val="0"/>
+              </a:spcAft>
+              <a:buClr>
+                <a:schemeClr val="accent1"/>
+              </a:buClr>
+              <a:buSzPts val="1300"/>
+              <a:buFont typeface="Lato"/>
+              <a:buChar char="●"/>
+              <a:defRPr sz="1300" b="0" i="0" u="none" strike="noStrike" cap="none">
+                <a:solidFill>
+                  <a:schemeClr val="accent1"/>
+                </a:solidFill>
+                <a:latin typeface="Lato"/>
+                <a:ea typeface="Lato"/>
+                <a:cs typeface="Lato"/>
+                <a:sym typeface="Lato"/>
+              </a:defRPr>
+            </a:lvl1pPr>
+            <a:lvl2pPr marL="914400" marR="0" lvl="1" indent="-298450" algn="l" rtl="0">
+              <a:lnSpc>
+                <a:spcPct val="115000"/>
+              </a:lnSpc>
+              <a:spcBef>
+                <a:spcPts val="1600"/>
+              </a:spcBef>
+              <a:spcAft>
+                <a:spcPts val="0"/>
+              </a:spcAft>
+              <a:buClr>
+                <a:schemeClr val="accent1"/>
+              </a:buClr>
+              <a:buSzPts val="1100"/>
+              <a:buFont typeface="Lato"/>
+              <a:buChar char="○"/>
+              <a:defRPr sz="1100" b="0" i="0" u="none" strike="noStrike" cap="none">
+                <a:solidFill>
+                  <a:schemeClr val="accent1"/>
+                </a:solidFill>
+                <a:latin typeface="Lato"/>
+                <a:ea typeface="Lato"/>
+                <a:cs typeface="Lato"/>
+                <a:sym typeface="Lato"/>
+              </a:defRPr>
+            </a:lvl2pPr>
+            <a:lvl3pPr marL="1371600" marR="0" lvl="2" indent="-298450" algn="l" rtl="0">
+              <a:lnSpc>
+                <a:spcPct val="115000"/>
+              </a:lnSpc>
+              <a:spcBef>
+                <a:spcPts val="1600"/>
+              </a:spcBef>
+              <a:spcAft>
+                <a:spcPts val="0"/>
+              </a:spcAft>
+              <a:buClr>
+                <a:schemeClr val="accent1"/>
+              </a:buClr>
+              <a:buSzPts val="1100"/>
+              <a:buFont typeface="Lato"/>
+              <a:buChar char="■"/>
+              <a:defRPr sz="1100" b="0" i="0" u="none" strike="noStrike" cap="none">
+                <a:solidFill>
+                  <a:schemeClr val="accent1"/>
+                </a:solidFill>
+                <a:latin typeface="Lato"/>
+                <a:ea typeface="Lato"/>
+                <a:cs typeface="Lato"/>
+                <a:sym typeface="Lato"/>
+              </a:defRPr>
+            </a:lvl3pPr>
+            <a:lvl4pPr marL="1828800" marR="0" lvl="3" indent="-298450" algn="l" rtl="0">
+              <a:lnSpc>
+                <a:spcPct val="115000"/>
+              </a:lnSpc>
+              <a:spcBef>
+                <a:spcPts val="1600"/>
+              </a:spcBef>
+              <a:spcAft>
+                <a:spcPts val="0"/>
+              </a:spcAft>
+              <a:buClr>
+                <a:schemeClr val="accent1"/>
+              </a:buClr>
+              <a:buSzPts val="1100"/>
+              <a:buFont typeface="Lato"/>
+              <a:buChar char="●"/>
+              <a:defRPr sz="1100" b="0" i="0" u="none" strike="noStrike" cap="none">
+                <a:solidFill>
+                  <a:schemeClr val="accent1"/>
+                </a:solidFill>
+                <a:latin typeface="Lato"/>
+                <a:ea typeface="Lato"/>
+                <a:cs typeface="Lato"/>
+                <a:sym typeface="Lato"/>
+              </a:defRPr>
+            </a:lvl4pPr>
+            <a:lvl5pPr marL="2286000" marR="0" lvl="4" indent="-298450" algn="l" rtl="0">
+              <a:lnSpc>
+                <a:spcPct val="115000"/>
+              </a:lnSpc>
+              <a:spcBef>
+                <a:spcPts val="1600"/>
+              </a:spcBef>
+              <a:spcAft>
+                <a:spcPts val="0"/>
+              </a:spcAft>
+              <a:buClr>
+                <a:schemeClr val="accent1"/>
+              </a:buClr>
+              <a:buSzPts val="1100"/>
+              <a:buFont typeface="Lato"/>
+              <a:buChar char="○"/>
+              <a:defRPr sz="1100" b="0" i="0" u="none" strike="noStrike" cap="none">
+                <a:solidFill>
+                  <a:schemeClr val="accent1"/>
+                </a:solidFill>
+                <a:latin typeface="Lato"/>
+                <a:ea typeface="Lato"/>
+                <a:cs typeface="Lato"/>
+                <a:sym typeface="Lato"/>
+              </a:defRPr>
+            </a:lvl5pPr>
+            <a:lvl6pPr marL="2743200" marR="0" lvl="5" indent="-298450" algn="l" rtl="0">
+              <a:lnSpc>
+                <a:spcPct val="115000"/>
+              </a:lnSpc>
+              <a:spcBef>
+                <a:spcPts val="1600"/>
+              </a:spcBef>
+              <a:spcAft>
+                <a:spcPts val="0"/>
+              </a:spcAft>
+              <a:buClr>
+                <a:schemeClr val="accent1"/>
+              </a:buClr>
+              <a:buSzPts val="1100"/>
+              <a:buFont typeface="Lato"/>
+              <a:buChar char="■"/>
+              <a:defRPr sz="1100" b="0" i="0" u="none" strike="noStrike" cap="none">
+                <a:solidFill>
+                  <a:schemeClr val="accent1"/>
+                </a:solidFill>
+                <a:latin typeface="Lato"/>
+                <a:ea typeface="Lato"/>
+                <a:cs typeface="Lato"/>
+                <a:sym typeface="Lato"/>
+              </a:defRPr>
+            </a:lvl6pPr>
+            <a:lvl7pPr marL="3200400" marR="0" lvl="6" indent="-298450" algn="l" rtl="0">
+              <a:lnSpc>
+                <a:spcPct val="115000"/>
+              </a:lnSpc>
+              <a:spcBef>
+                <a:spcPts val="1600"/>
+              </a:spcBef>
+              <a:spcAft>
+                <a:spcPts val="0"/>
+              </a:spcAft>
+              <a:buClr>
+                <a:schemeClr val="accent1"/>
+              </a:buClr>
+              <a:buSzPts val="1100"/>
+              <a:buFont typeface="Lato"/>
+              <a:buChar char="●"/>
+              <a:defRPr sz="1100" b="0" i="0" u="none" strike="noStrike" cap="none">
+                <a:solidFill>
+                  <a:schemeClr val="accent1"/>
+                </a:solidFill>
+                <a:latin typeface="Lato"/>
+                <a:ea typeface="Lato"/>
+                <a:cs typeface="Lato"/>
+                <a:sym typeface="Lato"/>
+              </a:defRPr>
+            </a:lvl7pPr>
+            <a:lvl8pPr marL="3657600" marR="0" lvl="7" indent="-298450" algn="l" rtl="0">
+              <a:lnSpc>
+                <a:spcPct val="115000"/>
+              </a:lnSpc>
+              <a:spcBef>
+                <a:spcPts val="1600"/>
+              </a:spcBef>
+              <a:spcAft>
+                <a:spcPts val="0"/>
+              </a:spcAft>
+              <a:buClr>
+                <a:schemeClr val="accent1"/>
+              </a:buClr>
+              <a:buSzPts val="1100"/>
+              <a:buFont typeface="Lato"/>
+              <a:buChar char="○"/>
+              <a:defRPr sz="1100" b="0" i="0" u="none" strike="noStrike" cap="none">
+                <a:solidFill>
+                  <a:schemeClr val="accent1"/>
+                </a:solidFill>
+                <a:latin typeface="Lato"/>
+                <a:ea typeface="Lato"/>
+                <a:cs typeface="Lato"/>
+                <a:sym typeface="Lato"/>
+              </a:defRPr>
+            </a:lvl8pPr>
+            <a:lvl9pPr marL="4114800" marR="0" lvl="8" indent="-298450" algn="l" rtl="0">
+              <a:lnSpc>
+                <a:spcPct val="115000"/>
+              </a:lnSpc>
+              <a:spcBef>
+                <a:spcPts val="1600"/>
+              </a:spcBef>
+              <a:spcAft>
+                <a:spcPts val="1600"/>
+              </a:spcAft>
+              <a:buClr>
+                <a:schemeClr val="accent1"/>
+              </a:buClr>
+              <a:buSzPts val="1100"/>
+              <a:buFont typeface="Lato"/>
+              <a:buChar char="■"/>
+              <a:defRPr sz="1100" b="0" i="0" u="none" strike="noStrike" cap="none">
+                <a:solidFill>
+                  <a:schemeClr val="accent1"/>
+                </a:solidFill>
+                <a:latin typeface="Lato"/>
+                <a:ea typeface="Lato"/>
+                <a:cs typeface="Lato"/>
+                <a:sym typeface="Lato"/>
+              </a:defRPr>
+            </a:lvl9pPr>
+          </a:lstStyle>
+          <a:p>
+            <a:pPr marL="146050" indent="0">
+              <a:buNone/>
+            </a:pPr>
+            <a:r>
+              <a:rPr lang="en-US" dirty="0"/>
+              <a:t>No very highly correlated variables or multicollinearity present </a:t>
+            </a:r>
+          </a:p>
+        </p:txBody>
+      </p:sp>
+    </p:spTree>
+    <p:custDataLst>
+      <p:tags r:id="rId1"/>
+    </p:custDataLst>
+    <p:extLst>
+      <p:ext uri="{BB962C8B-B14F-4D97-AF65-F5344CB8AC3E}">
+        <p14:creationId xmlns:p14="http://schemas.microsoft.com/office/powerpoint/2010/main" val="2424990968"/>
+      </p:ext>
+    </p:extLst>
+  </p:cSld>
+  <p:clrMapOvr>
+    <a:masterClrMapping/>
+  </p:clrMapOvr>
+</p:sld>
+</file>
+
+<file path=ppt/slides/slide12.xml><?xml version="1.0" encoding="utf-8"?>
+<p:sld xmlns:a="http://schemas.openxmlformats.org/drawingml/2006/main" xmlns:r="http://schemas.openxmlformats.org/officeDocument/2006/relationships" xmlns:p="http://schemas.openxmlformats.org/presentationml/2006/main">
+  <p:cSld>
+    <p:spTree>
+      <p:nvGrpSpPr>
+        <p:cNvPr id="1" name=""/>
+        <p:cNvGrpSpPr/>
+        <p:nvPr/>
+      </p:nvGrpSpPr>
+      <p:grpSpPr>
+        <a:xfrm>
+          <a:off x="0" y="0"/>
+          <a:ext cx="0" cy="0"/>
+          <a:chOff x="0" y="0"/>
+          <a:chExt cx="0" cy="0"/>
+        </a:xfrm>
+      </p:grpSpPr>
+      <p:sp>
+        <p:nvSpPr>
           <p:cNvPr id="2" name="Title 1">
             <a:extLst>
               <a:ext uri="{FF2B5EF4-FFF2-40B4-BE49-F238E27FC236}">
@@ -11858,7 +12730,7 @@
 </p:sld>
 </file>
 
-<file path=ppt/slides/slide12.xml><?xml version="1.0" encoding="utf-8"?>
+<file path=ppt/slides/slide13.xml><?xml version="1.0" encoding="utf-8"?>
 <p:sld xmlns:a="http://schemas.openxmlformats.org/drawingml/2006/main" xmlns:r="http://schemas.openxmlformats.org/officeDocument/2006/relationships" xmlns:p="http://schemas.openxmlformats.org/presentationml/2006/main">
   <p:cSld>
     <p:spTree>
@@ -12550,7 +13422,7 @@
 </p:sld>
 </file>
 
-<file path=ppt/slides/slide13.xml><?xml version="1.0" encoding="utf-8"?>
+<file path=ppt/slides/slide14.xml><?xml version="1.0" encoding="utf-8"?>
 <p:sld xmlns:a="http://schemas.openxmlformats.org/drawingml/2006/main" xmlns:r="http://schemas.openxmlformats.org/officeDocument/2006/relationships" xmlns:p="http://schemas.openxmlformats.org/presentationml/2006/main">
   <p:cSld>
     <p:spTree>
@@ -13327,7 +14199,7 @@
 </p:sld>
 </file>
 
-<file path=ppt/slides/slide14.xml><?xml version="1.0" encoding="utf-8"?>
+<file path=ppt/slides/slide15.xml><?xml version="1.0" encoding="utf-8"?>
 <p:sld xmlns:a="http://schemas.openxmlformats.org/drawingml/2006/main" xmlns:r="http://schemas.openxmlformats.org/officeDocument/2006/relationships" xmlns:p="http://schemas.openxmlformats.org/presentationml/2006/main">
   <p:cSld>
     <p:spTree>
@@ -13776,7 +14648,7 @@
 </p:sld>
 </file>
 
-<file path=ppt/slides/slide15.xml><?xml version="1.0" encoding="utf-8"?>
+<file path=ppt/slides/slide16.xml><?xml version="1.0" encoding="utf-8"?>
 <p:sld xmlns:a="http://schemas.openxmlformats.org/drawingml/2006/main" xmlns:r="http://schemas.openxmlformats.org/officeDocument/2006/relationships" xmlns:p="http://schemas.openxmlformats.org/presentationml/2006/main">
   <p:cSld>
     <p:spTree>
@@ -14273,7 +15145,7 @@
 </p:sld>
 </file>
 
-<file path=ppt/slides/slide16.xml><?xml version="1.0" encoding="utf-8"?>
+<file path=ppt/slides/slide17.xml><?xml version="1.0" encoding="utf-8"?>
 <p:sld xmlns:a="http://schemas.openxmlformats.org/drawingml/2006/main" xmlns:r="http://schemas.openxmlformats.org/officeDocument/2006/relationships" xmlns:p="http://schemas.openxmlformats.org/presentationml/2006/main">
   <p:cSld>
     <p:spTree>
@@ -14331,7 +15203,7 @@
 </p:sld>
 </file>
 
-<file path=ppt/slides/slide17.xml><?xml version="1.0" encoding="utf-8"?>
+<file path=ppt/slides/slide18.xml><?xml version="1.0" encoding="utf-8"?>
 <p:sld xmlns:a="http://schemas.openxmlformats.org/drawingml/2006/main" xmlns:r="http://schemas.openxmlformats.org/officeDocument/2006/relationships" xmlns:p="http://schemas.openxmlformats.org/presentationml/2006/main">
   <p:cSld>
     <p:spTree>
@@ -17568,6 +18440,12 @@
 </p:tagLst>
 </file>
 
+<file path=ppt/tags/tag11.xml><?xml version="1.0" encoding="utf-8"?>
+<p:tagLst xmlns:a="http://schemas.openxmlformats.org/drawingml/2006/main" xmlns:r="http://schemas.openxmlformats.org/officeDocument/2006/relationships" xmlns:p="http://schemas.openxmlformats.org/presentationml/2006/main">
+  <p:tag name="TIMING" val="|12.7|1.8|1|1.2|1.6|1.1|1.4|1.3|1.5|1.6|21.8"/>
+</p:tagLst>
+</file>
+
 <file path=ppt/tags/tag2.xml><?xml version="1.0" encoding="utf-8"?>
 <p:tagLst xmlns:a="http://schemas.openxmlformats.org/drawingml/2006/main" xmlns:r="http://schemas.openxmlformats.org/officeDocument/2006/relationships" xmlns:p="http://schemas.openxmlformats.org/presentationml/2006/main">
   <p:tag name="TIMING" val="|3.2|4.7|2.3"/>
@@ -17600,7 +18478,7 @@
 
 <file path=ppt/tags/tag7.xml><?xml version="1.0" encoding="utf-8"?>
 <p:tagLst xmlns:a="http://schemas.openxmlformats.org/drawingml/2006/main" xmlns:r="http://schemas.openxmlformats.org/officeDocument/2006/relationships" xmlns:p="http://schemas.openxmlformats.org/presentationml/2006/main">
-  <p:tag name="TIMING" val="|12.7|1.8|1|1.2|1.6|1.1|1.4|1.3|1.5|1.6|21.8"/>
+  <p:tag name="TIMING" val="|3.2|4.7|2.3"/>
 </p:tagLst>
 </file>
 

</xml_diff>